<commit_message>
Class 5 slides, updated examples and HW3
</commit_message>
<xml_diff>
--- a/Slides/Class 4.pptx
+++ b/Slides/Class 4.pptx
@@ -5824,14 +5824,14 @@
         <p:spPr bwMode="auto">
           <a:xfrm>
             <a:off x="415610" y="992766"/>
-            <a:ext cx="11360799" cy="2736799"/>
+            <a:ext cx="11360799" cy="2736798"/>
           </a:xfrm>
           <a:prstGeom prst="rect">
             <a:avLst/>
           </a:prstGeom>
         </p:spPr>
         <p:txBody>
-          <a:bodyPr spcFirstLastPara="1" wrap="square" lIns="91424" tIns="91424" rIns="91424" bIns="91424" anchor="b" anchorCtr="0">
+          <a:bodyPr spcFirstLastPara="1" wrap="square" lIns="91423" tIns="91423" rIns="91423" bIns="91423" anchor="b" anchorCtr="0">
             <a:noAutofit/>
           </a:bodyPr>
           <a:lstStyle>
@@ -5961,7 +5961,7 @@
           </a:prstGeom>
         </p:spPr>
         <p:txBody>
-          <a:bodyPr spcFirstLastPara="1" wrap="square" lIns="91424" tIns="91424" rIns="91424" bIns="91424" anchor="t" anchorCtr="0">
+          <a:bodyPr spcFirstLastPara="1" wrap="square" lIns="91423" tIns="91423" rIns="91423" bIns="91423" anchor="t" anchorCtr="0">
             <a:noAutofit/>
           </a:bodyPr>
           <a:lstStyle>
@@ -6118,7 +6118,7 @@
           </a:prstGeom>
         </p:spPr>
         <p:txBody>
-          <a:bodyPr spcFirstLastPara="1" wrap="square" lIns="91424" tIns="91424" rIns="91424" bIns="91424" anchor="ctr" anchorCtr="0">
+          <a:bodyPr spcFirstLastPara="1" wrap="square" lIns="91423" tIns="91423" rIns="91423" bIns="91423" anchor="ctr" anchorCtr="0">
             <a:noAutofit/>
           </a:bodyPr>
           <a:lstStyle>
@@ -6221,7 +6221,7 @@
           </a:prstGeom>
         </p:spPr>
         <p:txBody>
-          <a:bodyPr spcFirstLastPara="1" wrap="square" lIns="91424" tIns="91424" rIns="91424" bIns="91424" anchor="b" anchorCtr="0">
+          <a:bodyPr spcFirstLastPara="1" wrap="square" lIns="91423" tIns="91423" rIns="91423" bIns="91423" anchor="b" anchorCtr="0">
             <a:noAutofit/>
           </a:bodyPr>
           <a:lstStyle>
@@ -6355,7 +6355,7 @@
           </a:prstGeom>
         </p:spPr>
         <p:txBody>
-          <a:bodyPr spcFirstLastPara="1" wrap="square" lIns="91424" tIns="91424" rIns="91424" bIns="91424" anchor="t" anchorCtr="0">
+          <a:bodyPr spcFirstLastPara="1" wrap="square" lIns="91423" tIns="91423" rIns="91423" bIns="91423" anchor="t" anchorCtr="0">
             <a:noAutofit/>
           </a:bodyPr>
           <a:lstStyle>
@@ -6485,7 +6485,7 @@
           </a:prstGeom>
         </p:spPr>
         <p:txBody>
-          <a:bodyPr spcFirstLastPara="1" wrap="square" lIns="91424" tIns="91424" rIns="91424" bIns="91424" anchor="ctr" anchorCtr="0">
+          <a:bodyPr spcFirstLastPara="1" wrap="square" lIns="91423" tIns="91423" rIns="91423" bIns="91423" anchor="ctr" anchorCtr="0">
             <a:noAutofit/>
           </a:bodyPr>
           <a:lstStyle>
@@ -6588,7 +6588,7 @@
           </a:prstGeom>
         </p:spPr>
         <p:txBody>
-          <a:bodyPr spcFirstLastPara="1" wrap="square" lIns="91424" tIns="91424" rIns="91424" bIns="91424" anchor="ctr" anchorCtr="0">
+          <a:bodyPr spcFirstLastPara="1" wrap="square" lIns="91423" tIns="91423" rIns="91423" bIns="91423" anchor="ctr" anchorCtr="0">
             <a:noAutofit/>
           </a:bodyPr>
           <a:lstStyle>
@@ -6684,14 +6684,14 @@
         <p:spPr bwMode="auto">
           <a:xfrm>
             <a:off x="415610" y="992766"/>
-            <a:ext cx="11360799" cy="2736799"/>
+            <a:ext cx="11360799" cy="2736798"/>
           </a:xfrm>
           <a:prstGeom prst="rect">
             <a:avLst/>
           </a:prstGeom>
         </p:spPr>
         <p:txBody>
-          <a:bodyPr spcFirstLastPara="1" wrap="square" lIns="91424" tIns="91424" rIns="91424" bIns="91424" anchor="b" anchorCtr="0">
+          <a:bodyPr spcFirstLastPara="1" wrap="square" lIns="91423" tIns="91423" rIns="91423" bIns="91423" anchor="b" anchorCtr="0">
             <a:noAutofit/>
           </a:bodyPr>
           <a:lstStyle>
@@ -6821,7 +6821,7 @@
           </a:prstGeom>
         </p:spPr>
         <p:txBody>
-          <a:bodyPr spcFirstLastPara="1" wrap="square" lIns="91424" tIns="91424" rIns="91424" bIns="91424" anchor="t" anchorCtr="0">
+          <a:bodyPr spcFirstLastPara="1" wrap="square" lIns="91423" tIns="91423" rIns="91423" bIns="91423" anchor="t" anchorCtr="0">
             <a:noAutofit/>
           </a:bodyPr>
           <a:lstStyle>
@@ -6978,7 +6978,7 @@
           </a:prstGeom>
         </p:spPr>
         <p:txBody>
-          <a:bodyPr spcFirstLastPara="1" wrap="square" lIns="91424" tIns="91424" rIns="91424" bIns="91424" anchor="ctr" anchorCtr="0">
+          <a:bodyPr spcFirstLastPara="1" wrap="square" lIns="91423" tIns="91423" rIns="91423" bIns="91423" anchor="ctr" anchorCtr="0">
             <a:noAutofit/>
           </a:bodyPr>
           <a:lstStyle>
@@ -7081,7 +7081,7 @@
           </a:prstGeom>
         </p:spPr>
         <p:txBody>
-          <a:bodyPr spcFirstLastPara="1" wrap="square" lIns="91424" tIns="91424" rIns="91424" bIns="91424" anchor="ctr" anchorCtr="0">
+          <a:bodyPr spcFirstLastPara="1" wrap="square" lIns="91423" tIns="91423" rIns="91423" bIns="91423" anchor="ctr" anchorCtr="0">
             <a:noAutofit/>
           </a:bodyPr>
           <a:lstStyle>
@@ -7211,7 +7211,7 @@
           </a:prstGeom>
         </p:spPr>
         <p:txBody>
-          <a:bodyPr spcFirstLastPara="1" wrap="square" lIns="91424" tIns="91424" rIns="91424" bIns="91424" anchor="ctr" anchorCtr="0">
+          <a:bodyPr spcFirstLastPara="1" wrap="square" lIns="91423" tIns="91423" rIns="91423" bIns="91423" anchor="ctr" anchorCtr="0">
             <a:noAutofit/>
           </a:bodyPr>
           <a:lstStyle>
@@ -7314,7 +7314,7 @@
           </a:prstGeom>
         </p:spPr>
         <p:txBody>
-          <a:bodyPr spcFirstLastPara="1" wrap="square" lIns="91424" tIns="91424" rIns="91424" bIns="91424" anchor="t" anchorCtr="0">
+          <a:bodyPr spcFirstLastPara="1" wrap="square" lIns="91423" tIns="91423" rIns="91423" bIns="91423" anchor="t" anchorCtr="0">
             <a:noAutofit/>
           </a:bodyPr>
           <a:lstStyle>
@@ -7444,7 +7444,7 @@
           </a:prstGeom>
         </p:spPr>
         <p:txBody>
-          <a:bodyPr spcFirstLastPara="1" wrap="square" lIns="91424" tIns="91424" rIns="91424" bIns="91424" anchor="t" anchorCtr="0">
+          <a:bodyPr spcFirstLastPara="1" wrap="square" lIns="91423" tIns="91423" rIns="91423" bIns="91423" anchor="t" anchorCtr="0">
             <a:noAutofit/>
           </a:bodyPr>
           <a:lstStyle>
@@ -7574,7 +7574,7 @@
           </a:prstGeom>
         </p:spPr>
         <p:txBody>
-          <a:bodyPr spcFirstLastPara="1" wrap="square" lIns="91424" tIns="91424" rIns="91424" bIns="91424" anchor="ctr" anchorCtr="0">
+          <a:bodyPr spcFirstLastPara="1" wrap="square" lIns="91423" tIns="91423" rIns="91423" bIns="91423" anchor="ctr" anchorCtr="0">
             <a:noAutofit/>
           </a:bodyPr>
           <a:lstStyle>
@@ -7677,7 +7677,7 @@
           </a:prstGeom>
         </p:spPr>
         <p:txBody>
-          <a:bodyPr spcFirstLastPara="1" wrap="square" lIns="91424" tIns="91424" rIns="91424" bIns="91424" anchor="t" anchorCtr="0">
+          <a:bodyPr spcFirstLastPara="1" wrap="square" lIns="91423" tIns="91423" rIns="91423" bIns="91423" anchor="t" anchorCtr="0">
             <a:noAutofit/>
           </a:bodyPr>
           <a:lstStyle>
@@ -7807,7 +7807,7 @@
           </a:prstGeom>
         </p:spPr>
         <p:txBody>
-          <a:bodyPr spcFirstLastPara="1" wrap="square" lIns="91424" tIns="91424" rIns="91424" bIns="91424" anchor="t" anchorCtr="0">
+          <a:bodyPr spcFirstLastPara="1" wrap="square" lIns="91423" tIns="91423" rIns="91423" bIns="91423" anchor="t" anchorCtr="0">
             <a:noAutofit/>
           </a:bodyPr>
           <a:lstStyle>
@@ -7937,7 +7937,7 @@
           </a:prstGeom>
         </p:spPr>
         <p:txBody>
-          <a:bodyPr spcFirstLastPara="1" wrap="square" lIns="91424" tIns="91424" rIns="91424" bIns="91424" anchor="t" anchorCtr="0">
+          <a:bodyPr spcFirstLastPara="1" wrap="square" lIns="91423" tIns="91423" rIns="91423" bIns="91423" anchor="t" anchorCtr="0">
             <a:noAutofit/>
           </a:bodyPr>
           <a:lstStyle>
@@ -8067,7 +8067,7 @@
           </a:prstGeom>
         </p:spPr>
         <p:txBody>
-          <a:bodyPr spcFirstLastPara="1" wrap="square" lIns="91424" tIns="91424" rIns="91424" bIns="91424" anchor="ctr" anchorCtr="0">
+          <a:bodyPr spcFirstLastPara="1" wrap="square" lIns="91423" tIns="91423" rIns="91423" bIns="91423" anchor="ctr" anchorCtr="0">
             <a:noAutofit/>
           </a:bodyPr>
           <a:lstStyle>
@@ -8170,7 +8170,7 @@
           </a:prstGeom>
         </p:spPr>
         <p:txBody>
-          <a:bodyPr spcFirstLastPara="1" wrap="square" lIns="91424" tIns="91424" rIns="91424" bIns="91424" anchor="t" anchorCtr="0">
+          <a:bodyPr spcFirstLastPara="1" wrap="square" lIns="91423" tIns="91423" rIns="91423" bIns="91423" anchor="t" anchorCtr="0">
             <a:noAutofit/>
           </a:bodyPr>
           <a:lstStyle>
@@ -8300,7 +8300,7 @@
           </a:prstGeom>
         </p:spPr>
         <p:txBody>
-          <a:bodyPr spcFirstLastPara="1" wrap="square" lIns="91424" tIns="91424" rIns="91424" bIns="91424" anchor="ctr" anchorCtr="0">
+          <a:bodyPr spcFirstLastPara="1" wrap="square" lIns="91423" tIns="91423" rIns="91423" bIns="91423" anchor="ctr" anchorCtr="0">
             <a:noAutofit/>
           </a:bodyPr>
           <a:lstStyle>
@@ -8403,7 +8403,7 @@
           </a:prstGeom>
         </p:spPr>
         <p:txBody>
-          <a:bodyPr spcFirstLastPara="1" wrap="square" lIns="91424" tIns="91424" rIns="91424" bIns="91424" anchor="b" anchorCtr="0">
+          <a:bodyPr spcFirstLastPara="1" wrap="square" lIns="91423" tIns="91423" rIns="91423" bIns="91423" anchor="b" anchorCtr="0">
             <a:noAutofit/>
           </a:bodyPr>
           <a:lstStyle>
@@ -8533,7 +8533,7 @@
           </a:prstGeom>
         </p:spPr>
         <p:txBody>
-          <a:bodyPr spcFirstLastPara="1" wrap="square" lIns="91424" tIns="91424" rIns="91424" bIns="91424" anchor="t" anchorCtr="0">
+          <a:bodyPr spcFirstLastPara="1" wrap="square" lIns="91423" tIns="91423" rIns="91423" bIns="91423" anchor="t" anchorCtr="0">
             <a:noAutofit/>
           </a:bodyPr>
           <a:lstStyle>
@@ -8663,7 +8663,7 @@
           </a:prstGeom>
         </p:spPr>
         <p:txBody>
-          <a:bodyPr spcFirstLastPara="1" wrap="square" lIns="91424" tIns="91424" rIns="91424" bIns="91424" anchor="ctr" anchorCtr="0">
+          <a:bodyPr spcFirstLastPara="1" wrap="square" lIns="91423" tIns="91423" rIns="91423" bIns="91423" anchor="ctr" anchorCtr="0">
             <a:noAutofit/>
           </a:bodyPr>
           <a:lstStyle>
@@ -8766,7 +8766,7 @@
           </a:prstGeom>
         </p:spPr>
         <p:txBody>
-          <a:bodyPr spcFirstLastPara="1" wrap="square" lIns="91424" tIns="91424" rIns="91424" bIns="91424" anchor="ctr" anchorCtr="0">
+          <a:bodyPr spcFirstLastPara="1" wrap="square" lIns="91423" tIns="91423" rIns="91423" bIns="91423" anchor="ctr" anchorCtr="0">
             <a:noAutofit/>
           </a:bodyPr>
           <a:lstStyle>
@@ -8896,7 +8896,7 @@
           </a:prstGeom>
         </p:spPr>
         <p:txBody>
-          <a:bodyPr spcFirstLastPara="1" wrap="square" lIns="91424" tIns="91424" rIns="91424" bIns="91424" anchor="ctr" anchorCtr="0">
+          <a:bodyPr spcFirstLastPara="1" wrap="square" lIns="91423" tIns="91423" rIns="91423" bIns="91423" anchor="ctr" anchorCtr="0">
             <a:noAutofit/>
           </a:bodyPr>
           <a:lstStyle>
@@ -9003,7 +9003,7 @@
           </a:ln>
         </p:spPr>
         <p:txBody>
-          <a:bodyPr spcFirstLastPara="1" wrap="square" lIns="91424" tIns="91424" rIns="91424" bIns="91424" anchor="ctr" anchorCtr="0">
+          <a:bodyPr spcFirstLastPara="1" wrap="square" lIns="91423" tIns="91423" rIns="91423" bIns="91423" anchor="ctr" anchorCtr="0">
             <a:noAutofit/>
           </a:bodyPr>
           <a:lstStyle/>
@@ -9040,7 +9040,7 @@
           </a:prstGeom>
         </p:spPr>
         <p:txBody>
-          <a:bodyPr spcFirstLastPara="1" wrap="square" lIns="91424" tIns="91424" rIns="91424" bIns="91424" anchor="b" anchorCtr="0">
+          <a:bodyPr spcFirstLastPara="1" wrap="square" lIns="91423" tIns="91423" rIns="91423" bIns="91423" anchor="b" anchorCtr="0">
             <a:noAutofit/>
           </a:bodyPr>
           <a:lstStyle>
@@ -9170,7 +9170,7 @@
           </a:prstGeom>
         </p:spPr>
         <p:txBody>
-          <a:bodyPr spcFirstLastPara="1" wrap="square" lIns="91424" tIns="91424" rIns="91424" bIns="91424" anchor="t" anchorCtr="0">
+          <a:bodyPr spcFirstLastPara="1" wrap="square" lIns="91423" tIns="91423" rIns="91423" bIns="91423" anchor="t" anchorCtr="0">
             <a:noAutofit/>
           </a:bodyPr>
           <a:lstStyle>
@@ -9327,7 +9327,7 @@
           </a:prstGeom>
         </p:spPr>
         <p:txBody>
-          <a:bodyPr spcFirstLastPara="1" wrap="square" lIns="91424" tIns="91424" rIns="91424" bIns="91424" anchor="ctr" anchorCtr="0">
+          <a:bodyPr spcFirstLastPara="1" wrap="square" lIns="91423" tIns="91423" rIns="91423" bIns="91423" anchor="ctr" anchorCtr="0">
             <a:noAutofit/>
           </a:bodyPr>
           <a:lstStyle>
@@ -9520,7 +9520,7 @@
           </a:prstGeom>
         </p:spPr>
         <p:txBody>
-          <a:bodyPr spcFirstLastPara="1" wrap="square" lIns="91424" tIns="91424" rIns="91424" bIns="91424" anchor="ctr" anchorCtr="0">
+          <a:bodyPr spcFirstLastPara="1" wrap="square" lIns="91423" tIns="91423" rIns="91423" bIns="91423" anchor="ctr" anchorCtr="0">
             <a:noAutofit/>
           </a:bodyPr>
           <a:lstStyle>
@@ -9623,7 +9623,7 @@
           </a:prstGeom>
         </p:spPr>
         <p:txBody>
-          <a:bodyPr spcFirstLastPara="1" wrap="square" lIns="91424" tIns="91424" rIns="91424" bIns="91424" anchor="ctr" anchorCtr="0">
+          <a:bodyPr spcFirstLastPara="1" wrap="square" lIns="91423" tIns="91423" rIns="91423" bIns="91423" anchor="ctr" anchorCtr="0">
             <a:noAutofit/>
           </a:bodyPr>
           <a:lstStyle>
@@ -9753,7 +9753,7 @@
           </a:prstGeom>
         </p:spPr>
         <p:txBody>
-          <a:bodyPr spcFirstLastPara="1" wrap="square" lIns="91424" tIns="91424" rIns="91424" bIns="91424" anchor="ctr" anchorCtr="0">
+          <a:bodyPr spcFirstLastPara="1" wrap="square" lIns="91423" tIns="91423" rIns="91423" bIns="91423" anchor="ctr" anchorCtr="0">
             <a:noAutofit/>
           </a:bodyPr>
           <a:lstStyle>
@@ -9856,7 +9856,7 @@
           </a:prstGeom>
         </p:spPr>
         <p:txBody>
-          <a:bodyPr spcFirstLastPara="1" wrap="square" lIns="91424" tIns="91424" rIns="91424" bIns="91424" anchor="ctr" anchorCtr="0">
+          <a:bodyPr spcFirstLastPara="1" wrap="square" lIns="91423" tIns="91423" rIns="91423" bIns="91423" anchor="ctr" anchorCtr="0">
             <a:noAutofit/>
           </a:bodyPr>
           <a:lstStyle>
@@ -9901,7 +9901,7 @@
           </a:prstGeom>
         </p:spPr>
         <p:txBody>
-          <a:bodyPr spcFirstLastPara="1" wrap="square" lIns="91424" tIns="91424" rIns="91424" bIns="91424" anchor="ctr" anchorCtr="0">
+          <a:bodyPr spcFirstLastPara="1" wrap="square" lIns="91423" tIns="91423" rIns="91423" bIns="91423" anchor="ctr" anchorCtr="0">
             <a:noAutofit/>
           </a:bodyPr>
           <a:lstStyle>
@@ -10004,7 +10004,7 @@
           </a:prstGeom>
         </p:spPr>
         <p:txBody>
-          <a:bodyPr spcFirstLastPara="1" wrap="square" lIns="91424" tIns="91424" rIns="91424" bIns="91424" anchor="b" anchorCtr="0">
+          <a:bodyPr spcFirstLastPara="1" wrap="square" lIns="91423" tIns="91423" rIns="91423" bIns="91423" anchor="b" anchorCtr="0">
             <a:noAutofit/>
           </a:bodyPr>
           <a:lstStyle>
@@ -10138,7 +10138,7 @@
           </a:prstGeom>
         </p:spPr>
         <p:txBody>
-          <a:bodyPr spcFirstLastPara="1" wrap="square" lIns="91424" tIns="91424" rIns="91424" bIns="91424" anchor="t" anchorCtr="0">
+          <a:bodyPr spcFirstLastPara="1" wrap="square" lIns="91423" tIns="91423" rIns="91423" bIns="91423" anchor="t" anchorCtr="0">
             <a:noAutofit/>
           </a:bodyPr>
           <a:lstStyle>
@@ -10268,7 +10268,7 @@
           </a:prstGeom>
         </p:spPr>
         <p:txBody>
-          <a:bodyPr spcFirstLastPara="1" wrap="square" lIns="91424" tIns="91424" rIns="91424" bIns="91424" anchor="ctr" anchorCtr="0">
+          <a:bodyPr spcFirstLastPara="1" wrap="square" lIns="91423" tIns="91423" rIns="91423" bIns="91423" anchor="ctr" anchorCtr="0">
             <a:noAutofit/>
           </a:bodyPr>
           <a:lstStyle>
@@ -10371,7 +10371,7 @@
           </a:prstGeom>
         </p:spPr>
         <p:txBody>
-          <a:bodyPr spcFirstLastPara="1" wrap="square" lIns="91424" tIns="91424" rIns="91424" bIns="91424" anchor="ctr" anchorCtr="0">
+          <a:bodyPr spcFirstLastPara="1" wrap="square" lIns="91423" tIns="91423" rIns="91423" bIns="91423" anchor="ctr" anchorCtr="0">
             <a:noAutofit/>
           </a:bodyPr>
           <a:lstStyle>
@@ -10474,7 +10474,7 @@
           </a:prstGeom>
         </p:spPr>
         <p:txBody>
-          <a:bodyPr spcFirstLastPara="1" wrap="square" lIns="91424" tIns="91424" rIns="91424" bIns="91424" anchor="t" anchorCtr="0">
+          <a:bodyPr spcFirstLastPara="1" wrap="square" lIns="91423" tIns="91423" rIns="91423" bIns="91423" anchor="t" anchorCtr="0">
             <a:noAutofit/>
           </a:bodyPr>
           <a:lstStyle>
@@ -10604,7 +10604,7 @@
           </a:prstGeom>
         </p:spPr>
         <p:txBody>
-          <a:bodyPr spcFirstLastPara="1" wrap="square" lIns="91424" tIns="91424" rIns="91424" bIns="91424" anchor="t" anchorCtr="0">
+          <a:bodyPr spcFirstLastPara="1" wrap="square" lIns="91423" tIns="91423" rIns="91423" bIns="91423" anchor="t" anchorCtr="0">
             <a:noAutofit/>
           </a:bodyPr>
           <a:lstStyle>
@@ -10734,7 +10734,7 @@
           </a:prstGeom>
         </p:spPr>
         <p:txBody>
-          <a:bodyPr spcFirstLastPara="1" wrap="square" lIns="91424" tIns="91424" rIns="91424" bIns="91424" anchor="ctr" anchorCtr="0">
+          <a:bodyPr spcFirstLastPara="1" wrap="square" lIns="91423" tIns="91423" rIns="91423" bIns="91423" anchor="ctr" anchorCtr="0">
             <a:noAutofit/>
           </a:bodyPr>
           <a:lstStyle>
@@ -10837,7 +10837,7 @@
           </a:prstGeom>
         </p:spPr>
         <p:txBody>
-          <a:bodyPr spcFirstLastPara="1" wrap="square" lIns="91424" tIns="91424" rIns="91424" bIns="91424" anchor="t" anchorCtr="0">
+          <a:bodyPr spcFirstLastPara="1" wrap="square" lIns="91423" tIns="91423" rIns="91423" bIns="91423" anchor="t" anchorCtr="0">
             <a:noAutofit/>
           </a:bodyPr>
           <a:lstStyle>
@@ -10967,7 +10967,7 @@
           </a:prstGeom>
         </p:spPr>
         <p:txBody>
-          <a:bodyPr spcFirstLastPara="1" wrap="square" lIns="91424" tIns="91424" rIns="91424" bIns="91424" anchor="t" anchorCtr="0">
+          <a:bodyPr spcFirstLastPara="1" wrap="square" lIns="91423" tIns="91423" rIns="91423" bIns="91423" anchor="t" anchorCtr="0">
             <a:noAutofit/>
           </a:bodyPr>
           <a:lstStyle>
@@ -11097,7 +11097,7 @@
           </a:prstGeom>
         </p:spPr>
         <p:txBody>
-          <a:bodyPr spcFirstLastPara="1" wrap="square" lIns="91424" tIns="91424" rIns="91424" bIns="91424" anchor="t" anchorCtr="0">
+          <a:bodyPr spcFirstLastPara="1" wrap="square" lIns="91423" tIns="91423" rIns="91423" bIns="91423" anchor="t" anchorCtr="0">
             <a:noAutofit/>
           </a:bodyPr>
           <a:lstStyle>
@@ -11227,7 +11227,7 @@
           </a:prstGeom>
         </p:spPr>
         <p:txBody>
-          <a:bodyPr spcFirstLastPara="1" wrap="square" lIns="91424" tIns="91424" rIns="91424" bIns="91424" anchor="ctr" anchorCtr="0">
+          <a:bodyPr spcFirstLastPara="1" wrap="square" lIns="91423" tIns="91423" rIns="91423" bIns="91423" anchor="ctr" anchorCtr="0">
             <a:noAutofit/>
           </a:bodyPr>
           <a:lstStyle>
@@ -11330,7 +11330,7 @@
           </a:prstGeom>
         </p:spPr>
         <p:txBody>
-          <a:bodyPr spcFirstLastPara="1" wrap="square" lIns="91424" tIns="91424" rIns="91424" bIns="91424" anchor="t" anchorCtr="0">
+          <a:bodyPr spcFirstLastPara="1" wrap="square" lIns="91423" tIns="91423" rIns="91423" bIns="91423" anchor="t" anchorCtr="0">
             <a:noAutofit/>
           </a:bodyPr>
           <a:lstStyle>
@@ -11460,7 +11460,7 @@
           </a:prstGeom>
         </p:spPr>
         <p:txBody>
-          <a:bodyPr spcFirstLastPara="1" wrap="square" lIns="91424" tIns="91424" rIns="91424" bIns="91424" anchor="ctr" anchorCtr="0">
+          <a:bodyPr spcFirstLastPara="1" wrap="square" lIns="91423" tIns="91423" rIns="91423" bIns="91423" anchor="ctr" anchorCtr="0">
             <a:noAutofit/>
           </a:bodyPr>
           <a:lstStyle>
@@ -11563,7 +11563,7 @@
           </a:prstGeom>
         </p:spPr>
         <p:txBody>
-          <a:bodyPr spcFirstLastPara="1" wrap="square" lIns="91424" tIns="91424" rIns="91424" bIns="91424" anchor="b" anchorCtr="0">
+          <a:bodyPr spcFirstLastPara="1" wrap="square" lIns="91423" tIns="91423" rIns="91423" bIns="91423" anchor="b" anchorCtr="0">
             <a:noAutofit/>
           </a:bodyPr>
           <a:lstStyle>
@@ -11693,7 +11693,7 @@
           </a:prstGeom>
         </p:spPr>
         <p:txBody>
-          <a:bodyPr spcFirstLastPara="1" wrap="square" lIns="91424" tIns="91424" rIns="91424" bIns="91424" anchor="t" anchorCtr="0">
+          <a:bodyPr spcFirstLastPara="1" wrap="square" lIns="91423" tIns="91423" rIns="91423" bIns="91423" anchor="t" anchorCtr="0">
             <a:noAutofit/>
           </a:bodyPr>
           <a:lstStyle>
@@ -11823,7 +11823,7 @@
           </a:prstGeom>
         </p:spPr>
         <p:txBody>
-          <a:bodyPr spcFirstLastPara="1" wrap="square" lIns="91424" tIns="91424" rIns="91424" bIns="91424" anchor="ctr" anchorCtr="0">
+          <a:bodyPr spcFirstLastPara="1" wrap="square" lIns="91423" tIns="91423" rIns="91423" bIns="91423" anchor="ctr" anchorCtr="0">
             <a:noAutofit/>
           </a:bodyPr>
           <a:lstStyle>
@@ -11926,7 +11926,7 @@
           </a:prstGeom>
         </p:spPr>
         <p:txBody>
-          <a:bodyPr spcFirstLastPara="1" wrap="square" lIns="91424" tIns="91424" rIns="91424" bIns="91424" anchor="ctr" anchorCtr="0">
+          <a:bodyPr spcFirstLastPara="1" wrap="square" lIns="91423" tIns="91423" rIns="91423" bIns="91423" anchor="ctr" anchorCtr="0">
             <a:noAutofit/>
           </a:bodyPr>
           <a:lstStyle>
@@ -12056,7 +12056,7 @@
           </a:prstGeom>
         </p:spPr>
         <p:txBody>
-          <a:bodyPr spcFirstLastPara="1" wrap="square" lIns="91424" tIns="91424" rIns="91424" bIns="91424" anchor="ctr" anchorCtr="0">
+          <a:bodyPr spcFirstLastPara="1" wrap="square" lIns="91423" tIns="91423" rIns="91423" bIns="91423" anchor="ctr" anchorCtr="0">
             <a:noAutofit/>
           </a:bodyPr>
           <a:lstStyle>
@@ -12163,7 +12163,7 @@
           </a:ln>
         </p:spPr>
         <p:txBody>
-          <a:bodyPr spcFirstLastPara="1" wrap="square" lIns="91424" tIns="91424" rIns="91424" bIns="91424" anchor="ctr" anchorCtr="0">
+          <a:bodyPr spcFirstLastPara="1" wrap="square" lIns="91423" tIns="91423" rIns="91423" bIns="91423" anchor="ctr" anchorCtr="0">
             <a:noAutofit/>
           </a:bodyPr>
           <a:lstStyle/>
@@ -12200,7 +12200,7 @@
           </a:prstGeom>
         </p:spPr>
         <p:txBody>
-          <a:bodyPr spcFirstLastPara="1" wrap="square" lIns="91424" tIns="91424" rIns="91424" bIns="91424" anchor="b" anchorCtr="0">
+          <a:bodyPr spcFirstLastPara="1" wrap="square" lIns="91423" tIns="91423" rIns="91423" bIns="91423" anchor="b" anchorCtr="0">
             <a:noAutofit/>
           </a:bodyPr>
           <a:lstStyle>
@@ -12330,7 +12330,7 @@
           </a:prstGeom>
         </p:spPr>
         <p:txBody>
-          <a:bodyPr spcFirstLastPara="1" wrap="square" lIns="91424" tIns="91424" rIns="91424" bIns="91424" anchor="t" anchorCtr="0">
+          <a:bodyPr spcFirstLastPara="1" wrap="square" lIns="91423" tIns="91423" rIns="91423" bIns="91423" anchor="t" anchorCtr="0">
             <a:noAutofit/>
           </a:bodyPr>
           <a:lstStyle>
@@ -12487,7 +12487,7 @@
           </a:prstGeom>
         </p:spPr>
         <p:txBody>
-          <a:bodyPr spcFirstLastPara="1" wrap="square" lIns="91424" tIns="91424" rIns="91424" bIns="91424" anchor="ctr" anchorCtr="0">
+          <a:bodyPr spcFirstLastPara="1" wrap="square" lIns="91423" tIns="91423" rIns="91423" bIns="91423" anchor="ctr" anchorCtr="0">
             <a:noAutofit/>
           </a:bodyPr>
           <a:lstStyle>
@@ -12680,7 +12680,7 @@
           </a:prstGeom>
         </p:spPr>
         <p:txBody>
-          <a:bodyPr spcFirstLastPara="1" wrap="square" lIns="91424" tIns="91424" rIns="91424" bIns="91424" anchor="ctr" anchorCtr="0">
+          <a:bodyPr spcFirstLastPara="1" wrap="square" lIns="91423" tIns="91423" rIns="91423" bIns="91423" anchor="ctr" anchorCtr="0">
             <a:noAutofit/>
           </a:bodyPr>
           <a:lstStyle>
@@ -12783,7 +12783,7 @@
           </a:prstGeom>
         </p:spPr>
         <p:txBody>
-          <a:bodyPr spcFirstLastPara="1" wrap="square" lIns="91424" tIns="91424" rIns="91424" bIns="91424" anchor="ctr" anchorCtr="0">
+          <a:bodyPr spcFirstLastPara="1" wrap="square" lIns="91423" tIns="91423" rIns="91423" bIns="91423" anchor="ctr" anchorCtr="0">
             <a:noAutofit/>
           </a:bodyPr>
           <a:lstStyle>
@@ -12828,7 +12828,7 @@
           </a:prstGeom>
         </p:spPr>
         <p:txBody>
-          <a:bodyPr spcFirstLastPara="1" wrap="square" lIns="91424" tIns="91424" rIns="91424" bIns="91424" anchor="ctr" anchorCtr="0">
+          <a:bodyPr spcFirstLastPara="1" wrap="square" lIns="91423" tIns="91423" rIns="91423" bIns="91423" anchor="ctr" anchorCtr="0">
             <a:noAutofit/>
           </a:bodyPr>
           <a:lstStyle>
@@ -12942,7 +12942,7 @@
           </a:ln>
         </p:spPr>
         <p:txBody>
-          <a:bodyPr spcFirstLastPara="1" wrap="square" lIns="91424" tIns="91424" rIns="91424" bIns="91424" anchor="t" anchorCtr="0">
+          <a:bodyPr spcFirstLastPara="1" wrap="square" lIns="91423" tIns="91423" rIns="91423" bIns="91423" anchor="t" anchorCtr="0">
             <a:noAutofit/>
           </a:bodyPr>
           <a:lstStyle>
@@ -13139,7 +13139,7 @@
           </a:ln>
         </p:spPr>
         <p:txBody>
-          <a:bodyPr spcFirstLastPara="1" wrap="square" lIns="91424" tIns="91424" rIns="91424" bIns="91424" anchor="t" anchorCtr="0">
+          <a:bodyPr spcFirstLastPara="1" wrap="square" lIns="91423" tIns="91423" rIns="91423" bIns="91423" anchor="t" anchorCtr="0">
             <a:noAutofit/>
           </a:bodyPr>
           <a:lstStyle>
@@ -13363,7 +13363,7 @@
           </a:ln>
         </p:spPr>
         <p:txBody>
-          <a:bodyPr spcFirstLastPara="1" wrap="square" lIns="91424" tIns="91424" rIns="91424" bIns="91424" anchor="ctr" anchorCtr="0">
+          <a:bodyPr spcFirstLastPara="1" wrap="square" lIns="91423" tIns="91423" rIns="91423" bIns="91423" anchor="ctr" anchorCtr="0">
             <a:noAutofit/>
           </a:bodyPr>
           <a:lstStyle>
@@ -14187,7 +14187,7 @@
           </a:ln>
         </p:spPr>
         <p:txBody>
-          <a:bodyPr spcFirstLastPara="1" wrap="square" lIns="91424" tIns="91424" rIns="91424" bIns="91424" anchor="t" anchorCtr="0">
+          <a:bodyPr spcFirstLastPara="1" wrap="square" lIns="91423" tIns="91423" rIns="91423" bIns="91423" anchor="t" anchorCtr="0">
             <a:noAutofit/>
           </a:bodyPr>
           <a:lstStyle>
@@ -14384,7 +14384,7 @@
           </a:ln>
         </p:spPr>
         <p:txBody>
-          <a:bodyPr spcFirstLastPara="1" wrap="square" lIns="91424" tIns="91424" rIns="91424" bIns="91424" anchor="t" anchorCtr="0">
+          <a:bodyPr spcFirstLastPara="1" wrap="square" lIns="91423" tIns="91423" rIns="91423" bIns="91423" anchor="t" anchorCtr="0">
             <a:noAutofit/>
           </a:bodyPr>
           <a:lstStyle>
@@ -14608,7 +14608,7 @@
           </a:ln>
         </p:spPr>
         <p:txBody>
-          <a:bodyPr spcFirstLastPara="1" wrap="square" lIns="91424" tIns="91424" rIns="91424" bIns="91424" anchor="ctr" anchorCtr="0">
+          <a:bodyPr spcFirstLastPara="1" wrap="square" lIns="91423" tIns="91423" rIns="91423" bIns="91423" anchor="ctr" anchorCtr="0">
             <a:noAutofit/>
           </a:bodyPr>
           <a:lstStyle>
@@ -15488,7 +15488,7 @@
           </a:ln>
         </p:spPr>
         <p:txBody>
-          <a:bodyPr spcFirstLastPara="1" wrap="square" lIns="91424" tIns="91424" rIns="91424" bIns="91424" anchor="ctr" anchorCtr="0">
+          <a:bodyPr spcFirstLastPara="1" wrap="square" lIns="91423" tIns="91423" rIns="91423" bIns="91423" anchor="ctr" anchorCtr="0">
             <a:noAutofit/>
           </a:bodyPr>
           <a:lstStyle/>
@@ -15527,7 +15527,7 @@
           </a:ln>
         </p:spPr>
         <p:txBody>
-          <a:bodyPr spcFirstLastPara="1" wrap="square" lIns="91424" tIns="91424" rIns="91424" bIns="91424" anchor="t" anchorCtr="0">
+          <a:bodyPr spcFirstLastPara="1" wrap="square" lIns="91423" tIns="91423" rIns="91423" bIns="91423" anchor="t" anchorCtr="0">
             <a:noAutofit/>
           </a:bodyPr>
           <a:lstStyle/>
@@ -15578,7 +15578,7 @@
           </a:ln>
         </p:spPr>
         <p:txBody>
-          <a:bodyPr spcFirstLastPara="1" wrap="square" lIns="91424" tIns="91424" rIns="91424" bIns="91424" anchor="t" anchorCtr="0">
+          <a:bodyPr spcFirstLastPara="1" wrap="square" lIns="91423" tIns="91423" rIns="91423" bIns="91423" anchor="t" anchorCtr="0">
             <a:noAutofit/>
           </a:bodyPr>
           <a:lstStyle/>
@@ -15749,7 +15749,7 @@
           </a:ln>
         </p:spPr>
         <p:txBody>
-          <a:bodyPr spcFirstLastPara="1" wrap="square" lIns="91424" tIns="91424" rIns="91424" bIns="91424" anchor="ctr" anchorCtr="0">
+          <a:bodyPr spcFirstLastPara="1" wrap="square" lIns="91423" tIns="91423" rIns="91423" bIns="91423" anchor="ctr" anchorCtr="0">
             <a:noAutofit/>
           </a:bodyPr>
           <a:lstStyle/>
@@ -15790,7 +15790,7 @@
           </a:ln>
         </p:spPr>
         <p:txBody>
-          <a:bodyPr spcFirstLastPara="1" wrap="square" lIns="91424" tIns="91424" rIns="91424" bIns="91424" anchor="ctr" anchorCtr="0">
+          <a:bodyPr spcFirstLastPara="1" wrap="square" lIns="91423" tIns="91423" rIns="91423" bIns="91423" anchor="ctr" anchorCtr="0">
             <a:noAutofit/>
           </a:bodyPr>
           <a:lstStyle/>
@@ -15829,7 +15829,7 @@
           </a:ln>
         </p:spPr>
         <p:txBody>
-          <a:bodyPr spcFirstLastPara="1" wrap="square" lIns="91424" tIns="91424" rIns="91424" bIns="91424" anchor="ctr" anchorCtr="0">
+          <a:bodyPr spcFirstLastPara="1" wrap="square" lIns="91423" tIns="91423" rIns="91423" bIns="91423" anchor="ctr" anchorCtr="0">
             <a:noAutofit/>
           </a:bodyPr>
           <a:lstStyle/>
@@ -15948,7 +15948,7 @@
           </a:ln>
         </p:spPr>
         <p:txBody>
-          <a:bodyPr spcFirstLastPara="1" wrap="square" lIns="91424" tIns="91424" rIns="91424" bIns="91424" anchor="ctr" anchorCtr="0">
+          <a:bodyPr spcFirstLastPara="1" wrap="square" lIns="91423" tIns="91423" rIns="91423" bIns="91423" anchor="ctr" anchorCtr="0">
             <a:noAutofit/>
           </a:bodyPr>
           <a:lstStyle/>
@@ -15989,7 +15989,7 @@
           </a:ln>
         </p:spPr>
         <p:txBody>
-          <a:bodyPr spcFirstLastPara="1" wrap="square" lIns="91424" tIns="91424" rIns="91424" bIns="91424" anchor="ctr" anchorCtr="0">
+          <a:bodyPr spcFirstLastPara="1" wrap="square" lIns="91423" tIns="91423" rIns="91423" bIns="91423" anchor="ctr" anchorCtr="0">
             <a:noAutofit/>
           </a:bodyPr>
           <a:lstStyle/>
@@ -16028,7 +16028,7 @@
           </a:ln>
         </p:spPr>
         <p:txBody>
-          <a:bodyPr spcFirstLastPara="1" wrap="square" lIns="91424" tIns="91424" rIns="91424" bIns="91424" anchor="ctr" anchorCtr="0">
+          <a:bodyPr spcFirstLastPara="1" wrap="square" lIns="91423" tIns="91423" rIns="91423" bIns="91423" anchor="ctr" anchorCtr="0">
             <a:noAutofit/>
           </a:bodyPr>
           <a:lstStyle/>
@@ -16196,7 +16196,7 @@
           </a:ln>
         </p:spPr>
         <p:txBody>
-          <a:bodyPr spcFirstLastPara="1" wrap="square" lIns="91424" tIns="91424" rIns="91424" bIns="91424" anchor="ctr" anchorCtr="0">
+          <a:bodyPr spcFirstLastPara="1" wrap="square" lIns="91423" tIns="91423" rIns="91423" bIns="91423" anchor="ctr" anchorCtr="0">
             <a:noAutofit/>
           </a:bodyPr>
           <a:lstStyle/>
@@ -16237,7 +16237,7 @@
           </a:ln>
         </p:spPr>
         <p:txBody>
-          <a:bodyPr spcFirstLastPara="1" wrap="square" lIns="91424" tIns="91424" rIns="91424" bIns="91424" anchor="ctr" anchorCtr="0">
+          <a:bodyPr spcFirstLastPara="1" wrap="square" lIns="91423" tIns="91423" rIns="91423" bIns="91423" anchor="ctr" anchorCtr="0">
             <a:noAutofit/>
           </a:bodyPr>
           <a:lstStyle/>
@@ -16276,7 +16276,7 @@
           </a:ln>
         </p:spPr>
         <p:txBody>
-          <a:bodyPr spcFirstLastPara="1" wrap="square" lIns="91424" tIns="91424" rIns="91424" bIns="91424" anchor="ctr" anchorCtr="0">
+          <a:bodyPr spcFirstLastPara="1" wrap="square" lIns="91423" tIns="91423" rIns="91423" bIns="91423" anchor="ctr" anchorCtr="0">
             <a:noAutofit/>
           </a:bodyPr>
           <a:lstStyle/>
@@ -16425,7 +16425,7 @@
           </a:ln>
         </p:spPr>
         <p:txBody>
-          <a:bodyPr spcFirstLastPara="1" wrap="square" lIns="91424" tIns="91424" rIns="91424" bIns="91424" anchor="ctr" anchorCtr="0">
+          <a:bodyPr spcFirstLastPara="1" wrap="square" lIns="91423" tIns="91423" rIns="91423" bIns="91423" anchor="ctr" anchorCtr="0">
             <a:noAutofit/>
           </a:bodyPr>
           <a:lstStyle/>
@@ -16466,7 +16466,7 @@
           </a:ln>
         </p:spPr>
         <p:txBody>
-          <a:bodyPr spcFirstLastPara="1" wrap="square" lIns="91424" tIns="91424" rIns="91424" bIns="91424" anchor="ctr" anchorCtr="0">
+          <a:bodyPr spcFirstLastPara="1" wrap="square" lIns="91423" tIns="91423" rIns="91423" bIns="91423" anchor="ctr" anchorCtr="0">
             <a:noAutofit/>
           </a:bodyPr>
           <a:lstStyle/>
@@ -16505,7 +16505,7 @@
           </a:ln>
         </p:spPr>
         <p:txBody>
-          <a:bodyPr spcFirstLastPara="1" wrap="square" lIns="91424" tIns="91424" rIns="91424" bIns="91424" anchor="ctr" anchorCtr="0">
+          <a:bodyPr spcFirstLastPara="1" wrap="square" lIns="91423" tIns="91423" rIns="91423" bIns="91423" anchor="ctr" anchorCtr="0">
             <a:noAutofit/>
           </a:bodyPr>
           <a:lstStyle/>
@@ -16673,7 +16673,7 @@
           </a:ln>
         </p:spPr>
         <p:txBody>
-          <a:bodyPr spcFirstLastPara="1" wrap="square" lIns="91424" tIns="91424" rIns="91424" bIns="91424" anchor="ctr" anchorCtr="0">
+          <a:bodyPr spcFirstLastPara="1" wrap="square" lIns="91423" tIns="91423" rIns="91423" bIns="91423" anchor="ctr" anchorCtr="0">
             <a:noAutofit/>
           </a:bodyPr>
           <a:lstStyle/>
@@ -16714,7 +16714,7 @@
           </a:ln>
         </p:spPr>
         <p:txBody>
-          <a:bodyPr spcFirstLastPara="1" wrap="square" lIns="91424" tIns="91424" rIns="91424" bIns="91424" anchor="ctr" anchorCtr="0">
+          <a:bodyPr spcFirstLastPara="1" wrap="square" lIns="91423" tIns="91423" rIns="91423" bIns="91423" anchor="ctr" anchorCtr="0">
             <a:noAutofit/>
           </a:bodyPr>
           <a:lstStyle/>
@@ -16753,7 +16753,7 @@
           </a:ln>
         </p:spPr>
         <p:txBody>
-          <a:bodyPr spcFirstLastPara="1" wrap="square" lIns="91424" tIns="91424" rIns="91424" bIns="91424" anchor="ctr" anchorCtr="0">
+          <a:bodyPr spcFirstLastPara="1" wrap="square" lIns="91423" tIns="91423" rIns="91423" bIns="91423" anchor="ctr" anchorCtr="0">
             <a:noAutofit/>
           </a:bodyPr>
           <a:lstStyle/>
@@ -16938,7 +16938,7 @@
           </a:ln>
         </p:spPr>
         <p:txBody>
-          <a:bodyPr spcFirstLastPara="1" wrap="square" lIns="91424" tIns="91424" rIns="91424" bIns="91424" anchor="ctr" anchorCtr="0">
+          <a:bodyPr spcFirstLastPara="1" wrap="square" lIns="91423" tIns="91423" rIns="91423" bIns="91423" anchor="ctr" anchorCtr="0">
             <a:noAutofit/>
           </a:bodyPr>
           <a:lstStyle/>
@@ -16979,7 +16979,7 @@
           </a:ln>
         </p:spPr>
         <p:txBody>
-          <a:bodyPr spcFirstLastPara="1" wrap="square" lIns="91424" tIns="91424" rIns="91424" bIns="91424" anchor="ctr" anchorCtr="0">
+          <a:bodyPr spcFirstLastPara="1" wrap="square" lIns="91423" tIns="91423" rIns="91423" bIns="91423" anchor="ctr" anchorCtr="0">
             <a:noAutofit/>
           </a:bodyPr>
           <a:lstStyle/>
@@ -17018,7 +17018,7 @@
           </a:ln>
         </p:spPr>
         <p:txBody>
-          <a:bodyPr spcFirstLastPara="1" wrap="square" lIns="91424" tIns="91424" rIns="91424" bIns="91424" anchor="ctr" anchorCtr="0">
+          <a:bodyPr spcFirstLastPara="1" wrap="square" lIns="91423" tIns="91423" rIns="91423" bIns="91423" anchor="ctr" anchorCtr="0">
             <a:noAutofit/>
           </a:bodyPr>
           <a:lstStyle/>
@@ -17148,7 +17148,7 @@
           </a:ln>
         </p:spPr>
         <p:txBody>
-          <a:bodyPr spcFirstLastPara="1" wrap="square" lIns="91424" tIns="91424" rIns="91424" bIns="91424" anchor="ctr" anchorCtr="0">
+          <a:bodyPr spcFirstLastPara="1" wrap="square" lIns="91423" tIns="91423" rIns="91423" bIns="91423" anchor="ctr" anchorCtr="0">
             <a:noAutofit/>
           </a:bodyPr>
           <a:lstStyle/>
@@ -17189,7 +17189,7 @@
           </a:ln>
         </p:spPr>
         <p:txBody>
-          <a:bodyPr spcFirstLastPara="1" wrap="square" lIns="91424" tIns="91424" rIns="91424" bIns="91424" anchor="ctr" anchorCtr="0">
+          <a:bodyPr spcFirstLastPara="1" wrap="square" lIns="91423" tIns="91423" rIns="91423" bIns="91423" anchor="ctr" anchorCtr="0">
             <a:noAutofit/>
           </a:bodyPr>
           <a:lstStyle/>
@@ -17228,7 +17228,7 @@
           </a:ln>
         </p:spPr>
         <p:txBody>
-          <a:bodyPr spcFirstLastPara="1" wrap="square" lIns="91424" tIns="91424" rIns="91424" bIns="91424" anchor="ctr" anchorCtr="0">
+          <a:bodyPr spcFirstLastPara="1" wrap="square" lIns="91423" tIns="91423" rIns="91423" bIns="91423" anchor="ctr" anchorCtr="0">
             <a:noAutofit/>
           </a:bodyPr>
           <a:lstStyle/>
@@ -17342,7 +17342,7 @@
           </a:prstGeom>
         </p:spPr>
         <p:txBody>
-          <a:bodyPr spcFirstLastPara="1" wrap="square" lIns="91424" tIns="91424" rIns="91424" bIns="91424" anchor="ctr" anchorCtr="0">
+          <a:bodyPr spcFirstLastPara="1" wrap="square" lIns="91423" tIns="91423" rIns="91423" bIns="91423" anchor="ctr" anchorCtr="0">
             <a:noAutofit/>
           </a:bodyPr>
           <a:lstStyle/>
@@ -17416,7 +17416,7 @@
           </a:prstGeom>
         </p:spPr>
         <p:txBody>
-          <a:bodyPr spcFirstLastPara="1" wrap="square" lIns="91424" tIns="91424" rIns="91424" bIns="91424" anchor="ctr" anchorCtr="0">
+          <a:bodyPr spcFirstLastPara="1" wrap="square" lIns="91423" tIns="91423" rIns="91423" bIns="91423" anchor="ctr" anchorCtr="0">
             <a:noAutofit/>
           </a:bodyPr>
           <a:lstStyle/>
@@ -17522,7 +17522,7 @@
           </a:ln>
         </p:spPr>
         <p:txBody>
-          <a:bodyPr spcFirstLastPara="1" wrap="square" lIns="91424" tIns="91424" rIns="91424" bIns="91424" anchor="ctr" anchorCtr="0">
+          <a:bodyPr spcFirstLastPara="1" wrap="square" lIns="91423" tIns="91423" rIns="91423" bIns="91423" anchor="ctr" anchorCtr="0">
             <a:noAutofit/>
           </a:bodyPr>
           <a:lstStyle/>
@@ -17565,7 +17565,7 @@
           </a:ln>
         </p:spPr>
         <p:txBody>
-          <a:bodyPr spcFirstLastPara="1" wrap="square" lIns="91424" tIns="91424" rIns="91424" bIns="91424" anchor="ctr" anchorCtr="0">
+          <a:bodyPr spcFirstLastPara="1" wrap="square" lIns="91423" tIns="91423" rIns="91423" bIns="91423" anchor="ctr" anchorCtr="0">
             <a:noAutofit/>
           </a:bodyPr>
           <a:lstStyle/>
@@ -17628,14 +17628,14 @@
         <p:spPr bwMode="auto">
           <a:xfrm>
             <a:off x="415610" y="992766"/>
-            <a:ext cx="11360799" cy="2736799"/>
+            <a:ext cx="11360799" cy="2736798"/>
           </a:xfrm>
           <a:prstGeom prst="rect">
             <a:avLst/>
           </a:prstGeom>
         </p:spPr>
         <p:txBody>
-          <a:bodyPr spcFirstLastPara="1" wrap="square" lIns="91424" tIns="91424" rIns="91424" bIns="91424" anchor="b" anchorCtr="0">
+          <a:bodyPr spcFirstLastPara="1" wrap="square" lIns="91423" tIns="91423" rIns="91423" bIns="91423" anchor="b" anchorCtr="0">
             <a:noAutofit/>
           </a:bodyPr>
           <a:lstStyle/>
@@ -17676,7 +17676,7 @@
           </a:prstGeom>
         </p:spPr>
         <p:txBody>
-          <a:bodyPr spcFirstLastPara="1" wrap="square" lIns="91424" tIns="91424" rIns="91424" bIns="91424" anchor="t" anchorCtr="0">
+          <a:bodyPr spcFirstLastPara="1" wrap="square" lIns="91423" tIns="91423" rIns="91423" bIns="91423" anchor="t" anchorCtr="0">
             <a:noAutofit/>
           </a:bodyPr>
           <a:lstStyle/>
@@ -17759,7 +17759,7 @@
           </a:prstGeom>
         </p:spPr>
         <p:txBody>
-          <a:bodyPr spcFirstLastPara="1" wrap="square" lIns="91424" tIns="91424" rIns="91424" bIns="91424" anchor="ctr" anchorCtr="0">
+          <a:bodyPr spcFirstLastPara="1" wrap="square" lIns="91423" tIns="91423" rIns="91423" bIns="91423" anchor="ctr" anchorCtr="0">
             <a:noAutofit/>
           </a:bodyPr>
           <a:lstStyle/>
@@ -17841,7 +17841,7 @@
           </a:prstGeom>
         </p:spPr>
         <p:txBody>
-          <a:bodyPr spcFirstLastPara="1" wrap="square" lIns="91424" tIns="91424" rIns="91424" bIns="91424" anchor="ctr" anchorCtr="0">
+          <a:bodyPr spcFirstLastPara="1" wrap="square" lIns="91423" tIns="91423" rIns="91423" bIns="91423" anchor="ctr" anchorCtr="0">
             <a:noAutofit/>
           </a:bodyPr>
           <a:lstStyle/>
@@ -17917,7 +17917,7 @@
           </a:prstGeom>
         </p:spPr>
         <p:txBody>
-          <a:bodyPr spcFirstLastPara="1" wrap="square" lIns="91424" tIns="91424" rIns="91424" bIns="91424" anchor="ctr" anchorCtr="0">
+          <a:bodyPr spcFirstLastPara="1" wrap="square" lIns="91423" tIns="91423" rIns="91423" bIns="91423" anchor="ctr" anchorCtr="0">
             <a:noAutofit/>
           </a:bodyPr>
           <a:lstStyle/>
@@ -17993,7 +17993,7 @@
           </a:prstGeom>
         </p:spPr>
         <p:txBody>
-          <a:bodyPr spcFirstLastPara="1" wrap="square" lIns="91424" tIns="91424" rIns="91424" bIns="91424" anchor="ctr" anchorCtr="0">
+          <a:bodyPr spcFirstLastPara="1" wrap="square" lIns="91423" tIns="91423" rIns="91423" bIns="91423" anchor="ctr" anchorCtr="0">
             <a:noAutofit/>
           </a:bodyPr>
           <a:lstStyle/>
@@ -18075,7 +18075,7 @@
           </a:prstGeom>
         </p:spPr>
         <p:txBody>
-          <a:bodyPr spcFirstLastPara="1" wrap="square" lIns="91424" tIns="91424" rIns="91424" bIns="91424" anchor="ctr" anchorCtr="0">
+          <a:bodyPr spcFirstLastPara="1" wrap="square" lIns="91423" tIns="91423" rIns="91423" bIns="91423" anchor="ctr" anchorCtr="0">
             <a:noAutofit/>
           </a:bodyPr>
           <a:lstStyle/>
@@ -18151,7 +18151,7 @@
           </a:prstGeom>
         </p:spPr>
         <p:txBody>
-          <a:bodyPr spcFirstLastPara="1" wrap="square" lIns="91424" tIns="91424" rIns="91424" bIns="91424" anchor="ctr" anchorCtr="0">
+          <a:bodyPr spcFirstLastPara="1" wrap="square" lIns="91423" tIns="91423" rIns="91423" bIns="91423" anchor="ctr" anchorCtr="0">
             <a:noAutofit/>
           </a:bodyPr>
           <a:lstStyle/>
@@ -18425,7 +18425,7 @@
           </a:prstGeom>
         </p:spPr>
         <p:txBody>
-          <a:bodyPr spcFirstLastPara="1" wrap="square" lIns="91424" tIns="91424" rIns="91424" bIns="91424" anchor="ctr" anchorCtr="0">
+          <a:bodyPr spcFirstLastPara="1" wrap="square" lIns="91423" tIns="91423" rIns="91423" bIns="91423" anchor="ctr" anchorCtr="0">
             <a:noAutofit/>
           </a:bodyPr>
           <a:lstStyle/>
@@ -19006,7 +19006,7 @@
           </a:ln>
         </p:spPr>
         <p:txBody>
-          <a:bodyPr spcFirstLastPara="1" wrap="square" lIns="91424" tIns="91424" rIns="91424" bIns="91424" anchor="ctr" anchorCtr="0">
+          <a:bodyPr spcFirstLastPara="1" wrap="square" lIns="91423" tIns="91423" rIns="91423" bIns="91423" anchor="ctr" anchorCtr="0">
             <a:noAutofit/>
           </a:bodyPr>
           <a:lstStyle/>
@@ -19043,7 +19043,7 @@
           </a:prstGeom>
         </p:spPr>
         <p:txBody>
-          <a:bodyPr spcFirstLastPara="1" wrap="square" lIns="91424" tIns="91424" rIns="91424" bIns="91424" anchor="ctr" anchorCtr="0">
+          <a:bodyPr spcFirstLastPara="1" wrap="square" lIns="91423" tIns="91423" rIns="91423" bIns="91423" anchor="ctr" anchorCtr="0">
             <a:noAutofit/>
           </a:bodyPr>
           <a:lstStyle/>
@@ -19086,7 +19086,7 @@
           </a:ln>
         </p:spPr>
         <p:txBody>
-          <a:bodyPr spcFirstLastPara="1" wrap="square" lIns="91424" tIns="91424" rIns="91424" bIns="91424" anchor="t" anchorCtr="0">
+          <a:bodyPr spcFirstLastPara="1" wrap="square" lIns="91423" tIns="91423" rIns="91423" bIns="91423" anchor="t" anchorCtr="0">
             <a:noAutofit/>
           </a:bodyPr>
           <a:lstStyle/>
@@ -19145,7 +19145,7 @@
           </a:ln>
         </p:spPr>
         <p:txBody>
-          <a:bodyPr spcFirstLastPara="1" wrap="square" lIns="91424" tIns="91424" rIns="91424" bIns="91424" anchor="t" anchorCtr="0">
+          <a:bodyPr spcFirstLastPara="1" wrap="square" lIns="91423" tIns="91423" rIns="91423" bIns="91423" anchor="t" anchorCtr="0">
             <a:noAutofit/>
           </a:bodyPr>
           <a:lstStyle/>
@@ -19231,7 +19231,7 @@
         </p:blipFill>
         <p:spPr bwMode="auto">
           <a:xfrm>
-            <a:off x="0" y="0"/>
+            <a:off x="0" y="58079"/>
             <a:ext cx="12191986" cy="6858000"/>
           </a:xfrm>
           <a:prstGeom prst="rect">
@@ -19267,7 +19267,7 @@
           </a:ln>
         </p:spPr>
         <p:txBody>
-          <a:bodyPr spcFirstLastPara="1" wrap="square" lIns="91424" tIns="91424" rIns="91424" bIns="91424" anchor="ctr" anchorCtr="0">
+          <a:bodyPr spcFirstLastPara="1" wrap="square" lIns="91423" tIns="91423" rIns="91423" bIns="91423" anchor="ctr" anchorCtr="0">
             <a:noAutofit/>
           </a:bodyPr>
           <a:lstStyle/>
@@ -19310,7 +19310,7 @@
           </a:ln>
         </p:spPr>
         <p:txBody>
-          <a:bodyPr spcFirstLastPara="1" wrap="square" lIns="91424" tIns="91424" rIns="91424" bIns="91424" anchor="ctr" anchorCtr="0">
+          <a:bodyPr spcFirstLastPara="1" wrap="square" lIns="91423" tIns="91423" rIns="91423" bIns="91423" anchor="ctr" anchorCtr="0">
             <a:noAutofit/>
           </a:bodyPr>
           <a:lstStyle/>
@@ -19388,7 +19388,7 @@
           </a:ln>
         </p:spPr>
         <p:txBody>
-          <a:bodyPr spcFirstLastPara="1" wrap="square" lIns="91424" tIns="91424" rIns="91424" bIns="91424" anchor="ctr" anchorCtr="0">
+          <a:bodyPr spcFirstLastPara="1" wrap="square" lIns="91423" tIns="91423" rIns="91423" bIns="91423" anchor="ctr" anchorCtr="0">
             <a:noAutofit/>
           </a:bodyPr>
           <a:lstStyle/>
@@ -19427,7 +19427,7 @@
           </a:ln>
         </p:spPr>
         <p:txBody>
-          <a:bodyPr spcFirstLastPara="1" wrap="square" lIns="91424" tIns="91424" rIns="91424" bIns="91424" anchor="t" anchorCtr="0">
+          <a:bodyPr spcFirstLastPara="1" wrap="square" lIns="91423" tIns="91423" rIns="91423" bIns="91423" anchor="t" anchorCtr="0">
             <a:noAutofit/>
           </a:bodyPr>
           <a:lstStyle/>
@@ -19478,7 +19478,7 @@
           </a:ln>
         </p:spPr>
         <p:txBody>
-          <a:bodyPr spcFirstLastPara="1" wrap="square" lIns="91424" tIns="91424" rIns="91424" bIns="91424" anchor="t" anchorCtr="0">
+          <a:bodyPr spcFirstLastPara="1" wrap="square" lIns="91423" tIns="91423" rIns="91423" bIns="91423" anchor="t" anchorCtr="0">
             <a:noAutofit/>
           </a:bodyPr>
           <a:lstStyle/>
@@ -19649,7 +19649,7 @@
           </a:ln>
         </p:spPr>
         <p:txBody>
-          <a:bodyPr spcFirstLastPara="1" wrap="square" lIns="91424" tIns="91424" rIns="91424" bIns="91424" anchor="ctr" anchorCtr="0">
+          <a:bodyPr spcFirstLastPara="1" wrap="square" lIns="91423" tIns="91423" rIns="91423" bIns="91423" anchor="ctr" anchorCtr="0">
             <a:noAutofit/>
           </a:bodyPr>
           <a:lstStyle/>
@@ -19690,7 +19690,7 @@
           </a:ln>
         </p:spPr>
         <p:txBody>
-          <a:bodyPr spcFirstLastPara="1" wrap="square" lIns="91424" tIns="91424" rIns="91424" bIns="91424" anchor="ctr" anchorCtr="0">
+          <a:bodyPr spcFirstLastPara="1" wrap="square" lIns="91423" tIns="91423" rIns="91423" bIns="91423" anchor="ctr" anchorCtr="0">
             <a:noAutofit/>
           </a:bodyPr>
           <a:lstStyle/>
@@ -19729,7 +19729,7 @@
           </a:ln>
         </p:spPr>
         <p:txBody>
-          <a:bodyPr spcFirstLastPara="1" wrap="square" lIns="91424" tIns="91424" rIns="91424" bIns="91424" anchor="ctr" anchorCtr="0">
+          <a:bodyPr spcFirstLastPara="1" wrap="square" lIns="91423" tIns="91423" rIns="91423" bIns="91423" anchor="ctr" anchorCtr="0">
             <a:noAutofit/>
           </a:bodyPr>
           <a:lstStyle/>
@@ -19840,7 +19840,7 @@
           </a:ln>
         </p:spPr>
         <p:txBody>
-          <a:bodyPr spcFirstLastPara="1" wrap="square" lIns="91424" tIns="91424" rIns="91424" bIns="91424" anchor="ctr" anchorCtr="0">
+          <a:bodyPr spcFirstLastPara="1" wrap="square" lIns="91423" tIns="91423" rIns="91423" bIns="91423" anchor="ctr" anchorCtr="0">
             <a:noAutofit/>
           </a:bodyPr>
           <a:lstStyle/>
@@ -19881,7 +19881,7 @@
           </a:ln>
         </p:spPr>
         <p:txBody>
-          <a:bodyPr spcFirstLastPara="1" wrap="square" lIns="91424" tIns="91424" rIns="91424" bIns="91424" anchor="ctr" anchorCtr="0">
+          <a:bodyPr spcFirstLastPara="1" wrap="square" lIns="91423" tIns="91423" rIns="91423" bIns="91423" anchor="ctr" anchorCtr="0">
             <a:noAutofit/>
           </a:bodyPr>
           <a:lstStyle/>
@@ -19920,7 +19920,7 @@
           </a:ln>
         </p:spPr>
         <p:txBody>
-          <a:bodyPr spcFirstLastPara="1" wrap="square" lIns="91424" tIns="91424" rIns="91424" bIns="91424" anchor="ctr" anchorCtr="0">
+          <a:bodyPr spcFirstLastPara="1" wrap="square" lIns="91423" tIns="91423" rIns="91423" bIns="91423" anchor="ctr" anchorCtr="0">
             <a:noAutofit/>
           </a:bodyPr>
           <a:lstStyle/>
@@ -20102,7 +20102,7 @@
           </a:ln>
         </p:spPr>
         <p:txBody>
-          <a:bodyPr spcFirstLastPara="1" wrap="square" lIns="91424" tIns="91424" rIns="91424" bIns="91424" anchor="ctr" anchorCtr="0">
+          <a:bodyPr spcFirstLastPara="1" wrap="square" lIns="91423" tIns="91423" rIns="91423" bIns="91423" anchor="ctr" anchorCtr="0">
             <a:noAutofit/>
           </a:bodyPr>
           <a:lstStyle/>
@@ -20143,7 +20143,7 @@
           </a:ln>
         </p:spPr>
         <p:txBody>
-          <a:bodyPr spcFirstLastPara="1" wrap="square" lIns="91424" tIns="91424" rIns="91424" bIns="91424" anchor="ctr" anchorCtr="0">
+          <a:bodyPr spcFirstLastPara="1" wrap="square" lIns="91423" tIns="91423" rIns="91423" bIns="91423" anchor="ctr" anchorCtr="0">
             <a:noAutofit/>
           </a:bodyPr>
           <a:lstStyle/>
@@ -20182,7 +20182,7 @@
           </a:ln>
         </p:spPr>
         <p:txBody>
-          <a:bodyPr spcFirstLastPara="1" wrap="square" lIns="91424" tIns="91424" rIns="91424" bIns="91424" anchor="ctr" anchorCtr="0">
+          <a:bodyPr spcFirstLastPara="1" wrap="square" lIns="91423" tIns="91423" rIns="91423" bIns="91423" anchor="ctr" anchorCtr="0">
             <a:noAutofit/>
           </a:bodyPr>
           <a:lstStyle/>
@@ -20383,7 +20383,7 @@
           </a:ln>
         </p:spPr>
         <p:txBody>
-          <a:bodyPr spcFirstLastPara="1" wrap="square" lIns="91424" tIns="91424" rIns="91424" bIns="91424" anchor="ctr" anchorCtr="0">
+          <a:bodyPr spcFirstLastPara="1" wrap="square" lIns="91423" tIns="91423" rIns="91423" bIns="91423" anchor="ctr" anchorCtr="0">
             <a:noAutofit/>
           </a:bodyPr>
           <a:lstStyle/>
@@ -20424,7 +20424,7 @@
           </a:ln>
         </p:spPr>
         <p:txBody>
-          <a:bodyPr spcFirstLastPara="1" wrap="square" lIns="91424" tIns="91424" rIns="91424" bIns="91424" anchor="ctr" anchorCtr="0">
+          <a:bodyPr spcFirstLastPara="1" wrap="square" lIns="91423" tIns="91423" rIns="91423" bIns="91423" anchor="ctr" anchorCtr="0">
             <a:noAutofit/>
           </a:bodyPr>
           <a:lstStyle/>
@@ -20463,7 +20463,7 @@
           </a:ln>
         </p:spPr>
         <p:txBody>
-          <a:bodyPr spcFirstLastPara="1" wrap="square" lIns="91424" tIns="91424" rIns="91424" bIns="91424" anchor="ctr" anchorCtr="0">
+          <a:bodyPr spcFirstLastPara="1" wrap="square" lIns="91423" tIns="91423" rIns="91423" bIns="91423" anchor="ctr" anchorCtr="0">
             <a:noAutofit/>
           </a:bodyPr>
           <a:lstStyle/>
@@ -20626,7 +20626,7 @@
           </a:ln>
         </p:spPr>
         <p:txBody>
-          <a:bodyPr spcFirstLastPara="1" wrap="square" lIns="91424" tIns="91424" rIns="91424" bIns="91424" anchor="ctr" anchorCtr="0">
+          <a:bodyPr spcFirstLastPara="1" wrap="square" lIns="91423" tIns="91423" rIns="91423" bIns="91423" anchor="ctr" anchorCtr="0">
             <a:noAutofit/>
           </a:bodyPr>
           <a:lstStyle/>
@@ -20667,7 +20667,7 @@
           </a:ln>
         </p:spPr>
         <p:txBody>
-          <a:bodyPr spcFirstLastPara="1" wrap="square" lIns="91424" tIns="91424" rIns="91424" bIns="91424" anchor="ctr" anchorCtr="0">
+          <a:bodyPr spcFirstLastPara="1" wrap="square" lIns="91423" tIns="91423" rIns="91423" bIns="91423" anchor="ctr" anchorCtr="0">
             <a:noAutofit/>
           </a:bodyPr>
           <a:lstStyle/>
@@ -20706,7 +20706,7 @@
           </a:ln>
         </p:spPr>
         <p:txBody>
-          <a:bodyPr spcFirstLastPara="1" wrap="square" lIns="91424" tIns="91424" rIns="91424" bIns="91424" anchor="ctr" anchorCtr="0">
+          <a:bodyPr spcFirstLastPara="1" wrap="square" lIns="91423" tIns="91423" rIns="91423" bIns="91423" anchor="ctr" anchorCtr="0">
             <a:noAutofit/>
           </a:bodyPr>
           <a:lstStyle/>
@@ -20936,7 +20936,7 @@
           </a:ln>
         </p:spPr>
         <p:txBody>
-          <a:bodyPr spcFirstLastPara="1" wrap="square" lIns="91424" tIns="91424" rIns="91424" bIns="91424" anchor="ctr" anchorCtr="0">
+          <a:bodyPr spcFirstLastPara="1" wrap="square" lIns="91423" tIns="91423" rIns="91423" bIns="91423" anchor="ctr" anchorCtr="0">
             <a:noAutofit/>
           </a:bodyPr>
           <a:lstStyle/>
@@ -20977,7 +20977,7 @@
           </a:ln>
         </p:spPr>
         <p:txBody>
-          <a:bodyPr spcFirstLastPara="1" wrap="square" lIns="91424" tIns="91424" rIns="91424" bIns="91424" anchor="ctr" anchorCtr="0">
+          <a:bodyPr spcFirstLastPara="1" wrap="square" lIns="91423" tIns="91423" rIns="91423" bIns="91423" anchor="ctr" anchorCtr="0">
             <a:noAutofit/>
           </a:bodyPr>
           <a:lstStyle/>
@@ -21016,7 +21016,7 @@
           </a:ln>
         </p:spPr>
         <p:txBody>
-          <a:bodyPr spcFirstLastPara="1" wrap="square" lIns="91424" tIns="91424" rIns="91424" bIns="91424" anchor="ctr" anchorCtr="0">
+          <a:bodyPr spcFirstLastPara="1" wrap="square" lIns="91423" tIns="91423" rIns="91423" bIns="91423" anchor="ctr" anchorCtr="0">
             <a:noAutofit/>
           </a:bodyPr>
           <a:lstStyle/>
@@ -21189,7 +21189,7 @@
         <p:spPr bwMode="auto">
           <a:xfrm>
             <a:off x="5419081" y="2551650"/>
-            <a:ext cx="582567" cy="559265"/>
+            <a:ext cx="582566" cy="559265"/>
           </a:xfrm>
           <a:custGeom>
             <a:avLst/>
@@ -21509,7 +21509,7 @@
           </a:ln>
         </p:spPr>
         <p:txBody>
-          <a:bodyPr spcFirstLastPara="1" wrap="square" lIns="91424" tIns="91424" rIns="91424" bIns="91424" anchor="ctr" anchorCtr="0">
+          <a:bodyPr spcFirstLastPara="1" wrap="square" lIns="91423" tIns="91423" rIns="91423" bIns="91423" anchor="ctr" anchorCtr="0">
             <a:noAutofit/>
           </a:bodyPr>
           <a:lstStyle/>
@@ -21550,7 +21550,7 @@
           </a:ln>
         </p:spPr>
         <p:txBody>
-          <a:bodyPr spcFirstLastPara="1" wrap="square" lIns="91424" tIns="91424" rIns="91424" bIns="91424" anchor="ctr" anchorCtr="0">
+          <a:bodyPr spcFirstLastPara="1" wrap="square" lIns="91423" tIns="91423" rIns="91423" bIns="91423" anchor="ctr" anchorCtr="0">
             <a:noAutofit/>
           </a:bodyPr>
           <a:lstStyle/>
@@ -21589,7 +21589,7 @@
           </a:ln>
         </p:spPr>
         <p:txBody>
-          <a:bodyPr spcFirstLastPara="1" wrap="square" lIns="91424" tIns="91424" rIns="91424" bIns="91424" anchor="ctr" anchorCtr="0">
+          <a:bodyPr spcFirstLastPara="1" wrap="square" lIns="91423" tIns="91423" rIns="91423" bIns="91423" anchor="ctr" anchorCtr="0">
             <a:noAutofit/>
           </a:bodyPr>
           <a:lstStyle/>
@@ -21739,7 +21739,7 @@
           </a:ln>
         </p:spPr>
         <p:txBody>
-          <a:bodyPr spcFirstLastPara="1" wrap="square" lIns="91424" tIns="91424" rIns="91424" bIns="91424" anchor="ctr" anchorCtr="0">
+          <a:bodyPr spcFirstLastPara="1" wrap="square" lIns="91423" tIns="91423" rIns="91423" bIns="91423" anchor="ctr" anchorCtr="0">
             <a:noAutofit/>
           </a:bodyPr>
           <a:lstStyle/>
@@ -21780,7 +21780,7 @@
           </a:ln>
         </p:spPr>
         <p:txBody>
-          <a:bodyPr spcFirstLastPara="1" wrap="square" lIns="91424" tIns="91424" rIns="91424" bIns="91424" anchor="ctr" anchorCtr="0">
+          <a:bodyPr spcFirstLastPara="1" wrap="square" lIns="91423" tIns="91423" rIns="91423" bIns="91423" anchor="ctr" anchorCtr="0">
             <a:noAutofit/>
           </a:bodyPr>
           <a:lstStyle/>
@@ -21819,7 +21819,7 @@
           </a:ln>
         </p:spPr>
         <p:txBody>
-          <a:bodyPr spcFirstLastPara="1" wrap="square" lIns="91424" tIns="91424" rIns="91424" bIns="91424" anchor="ctr" anchorCtr="0">
+          <a:bodyPr spcFirstLastPara="1" wrap="square" lIns="91423" tIns="91423" rIns="91423" bIns="91423" anchor="ctr" anchorCtr="0">
             <a:noAutofit/>
           </a:bodyPr>
           <a:lstStyle/>
@@ -21938,7 +21938,7 @@
           </a:ln>
         </p:spPr>
         <p:txBody>
-          <a:bodyPr spcFirstLastPara="1" wrap="square" lIns="91424" tIns="91424" rIns="91424" bIns="91424" anchor="ctr" anchorCtr="0">
+          <a:bodyPr spcFirstLastPara="1" wrap="square" lIns="91423" tIns="91423" rIns="91423" bIns="91423" anchor="ctr" anchorCtr="0">
             <a:noAutofit/>
           </a:bodyPr>
           <a:lstStyle/>
@@ -21979,7 +21979,7 @@
           </a:ln>
         </p:spPr>
         <p:txBody>
-          <a:bodyPr spcFirstLastPara="1" wrap="square" lIns="91424" tIns="91424" rIns="91424" bIns="91424" anchor="ctr" anchorCtr="0">
+          <a:bodyPr spcFirstLastPara="1" wrap="square" lIns="91423" tIns="91423" rIns="91423" bIns="91423" anchor="ctr" anchorCtr="0">
             <a:noAutofit/>
           </a:bodyPr>
           <a:lstStyle/>
@@ -22018,7 +22018,7 @@
           </a:ln>
         </p:spPr>
         <p:txBody>
-          <a:bodyPr spcFirstLastPara="1" wrap="square" lIns="91424" tIns="91424" rIns="91424" bIns="91424" anchor="ctr" anchorCtr="0">
+          <a:bodyPr spcFirstLastPara="1" wrap="square" lIns="91423" tIns="91423" rIns="91423" bIns="91423" anchor="ctr" anchorCtr="0">
             <a:noAutofit/>
           </a:bodyPr>
           <a:lstStyle/>
@@ -22183,7 +22183,7 @@
           </a:ln>
         </p:spPr>
         <p:txBody>
-          <a:bodyPr spcFirstLastPara="1" wrap="square" lIns="91424" tIns="91424" rIns="91424" bIns="91424" anchor="ctr" anchorCtr="0">
+          <a:bodyPr spcFirstLastPara="1" wrap="square" lIns="91423" tIns="91423" rIns="91423" bIns="91423" anchor="ctr" anchorCtr="0">
             <a:noAutofit/>
           </a:bodyPr>
           <a:lstStyle/>
@@ -22226,7 +22226,7 @@
           </a:ln>
         </p:spPr>
         <p:txBody>
-          <a:bodyPr spcFirstLastPara="1" wrap="square" lIns="91424" tIns="91424" rIns="91424" bIns="91424" anchor="ctr" anchorCtr="0">
+          <a:bodyPr spcFirstLastPara="1" wrap="square" lIns="91423" tIns="91423" rIns="91423" bIns="91423" anchor="ctr" anchorCtr="0">
             <a:noAutofit/>
           </a:bodyPr>
           <a:lstStyle/>
@@ -22307,7 +22307,7 @@
           </a:ln>
         </p:spPr>
         <p:txBody>
-          <a:bodyPr spcFirstLastPara="1" wrap="square" lIns="91424" tIns="91424" rIns="91424" bIns="91424" anchor="ctr" anchorCtr="0">
+          <a:bodyPr spcFirstLastPara="1" wrap="square" lIns="91423" tIns="91423" rIns="91423" bIns="91423" anchor="ctr" anchorCtr="0">
             <a:noAutofit/>
           </a:bodyPr>
           <a:lstStyle/>
@@ -22348,7 +22348,7 @@
           </a:ln>
         </p:spPr>
         <p:txBody>
-          <a:bodyPr spcFirstLastPara="1" wrap="square" lIns="91424" tIns="91424" rIns="91424" bIns="91424" anchor="ctr" anchorCtr="0">
+          <a:bodyPr spcFirstLastPara="1" wrap="square" lIns="91423" tIns="91423" rIns="91423" bIns="91423" anchor="ctr" anchorCtr="0">
             <a:noAutofit/>
           </a:bodyPr>
           <a:lstStyle/>
@@ -22387,7 +22387,7 @@
           </a:ln>
         </p:spPr>
         <p:txBody>
-          <a:bodyPr spcFirstLastPara="1" wrap="square" lIns="91424" tIns="91424" rIns="91424" bIns="91424" anchor="ctr" anchorCtr="0">
+          <a:bodyPr spcFirstLastPara="1" wrap="square" lIns="91423" tIns="91423" rIns="91423" bIns="91423" anchor="ctr" anchorCtr="0">
             <a:noAutofit/>
           </a:bodyPr>
           <a:lstStyle/>
@@ -22687,7 +22687,7 @@
           </a:ln>
         </p:spPr>
         <p:txBody>
-          <a:bodyPr spcFirstLastPara="1" wrap="square" lIns="91424" tIns="91424" rIns="91424" bIns="91424" anchor="ctr" anchorCtr="0">
+          <a:bodyPr spcFirstLastPara="1" wrap="square" lIns="91423" tIns="91423" rIns="91423" bIns="91423" anchor="ctr" anchorCtr="0">
             <a:noAutofit/>
           </a:bodyPr>
           <a:lstStyle/>
@@ -22728,7 +22728,7 @@
           </a:ln>
         </p:spPr>
         <p:txBody>
-          <a:bodyPr spcFirstLastPara="1" wrap="square" lIns="91424" tIns="91424" rIns="91424" bIns="91424" anchor="ctr" anchorCtr="0">
+          <a:bodyPr spcFirstLastPara="1" wrap="square" lIns="91423" tIns="91423" rIns="91423" bIns="91423" anchor="ctr" anchorCtr="0">
             <a:noAutofit/>
           </a:bodyPr>
           <a:lstStyle/>
@@ -22767,7 +22767,7 @@
           </a:ln>
         </p:spPr>
         <p:txBody>
-          <a:bodyPr spcFirstLastPara="1" wrap="square" lIns="91424" tIns="91424" rIns="91424" bIns="91424" anchor="ctr" anchorCtr="0">
+          <a:bodyPr spcFirstLastPara="1" wrap="square" lIns="91423" tIns="91423" rIns="91423" bIns="91423" anchor="ctr" anchorCtr="0">
             <a:noAutofit/>
           </a:bodyPr>
           <a:lstStyle/>
@@ -22930,7 +22930,7 @@
           </a:ln>
         </p:spPr>
         <p:txBody>
-          <a:bodyPr spcFirstLastPara="1" wrap="square" lIns="91424" tIns="91424" rIns="91424" bIns="91424" anchor="ctr" anchorCtr="0">
+          <a:bodyPr spcFirstLastPara="1" wrap="square" lIns="91423" tIns="91423" rIns="91423" bIns="91423" anchor="ctr" anchorCtr="0">
             <a:noAutofit/>
           </a:bodyPr>
           <a:lstStyle/>
@@ -22971,7 +22971,7 @@
           </a:ln>
         </p:spPr>
         <p:txBody>
-          <a:bodyPr spcFirstLastPara="1" wrap="square" lIns="91424" tIns="91424" rIns="91424" bIns="91424" anchor="ctr" anchorCtr="0">
+          <a:bodyPr spcFirstLastPara="1" wrap="square" lIns="91423" tIns="91423" rIns="91423" bIns="91423" anchor="ctr" anchorCtr="0">
             <a:noAutofit/>
           </a:bodyPr>
           <a:lstStyle/>
@@ -23010,7 +23010,7 @@
           </a:ln>
         </p:spPr>
         <p:txBody>
-          <a:bodyPr spcFirstLastPara="1" wrap="square" lIns="91424" tIns="91424" rIns="91424" bIns="91424" anchor="ctr" anchorCtr="0">
+          <a:bodyPr spcFirstLastPara="1" wrap="square" lIns="91423" tIns="91423" rIns="91423" bIns="91423" anchor="ctr" anchorCtr="0">
             <a:noAutofit/>
           </a:bodyPr>
           <a:lstStyle/>
@@ -23154,7 +23154,7 @@
           </a:ln>
         </p:spPr>
         <p:txBody>
-          <a:bodyPr spcFirstLastPara="1" wrap="square" lIns="91424" tIns="91424" rIns="91424" bIns="91424" anchor="ctr" anchorCtr="0">
+          <a:bodyPr spcFirstLastPara="1" wrap="square" lIns="91423" tIns="91423" rIns="91423" bIns="91423" anchor="ctr" anchorCtr="0">
             <a:noAutofit/>
           </a:bodyPr>
           <a:lstStyle/>
@@ -23195,7 +23195,7 @@
           </a:ln>
         </p:spPr>
         <p:txBody>
-          <a:bodyPr spcFirstLastPara="1" wrap="square" lIns="91424" tIns="91424" rIns="91424" bIns="91424" anchor="ctr" anchorCtr="0">
+          <a:bodyPr spcFirstLastPara="1" wrap="square" lIns="91423" tIns="91423" rIns="91423" bIns="91423" anchor="ctr" anchorCtr="0">
             <a:noAutofit/>
           </a:bodyPr>
           <a:lstStyle/>
@@ -23234,7 +23234,7 @@
           </a:ln>
         </p:spPr>
         <p:txBody>
-          <a:bodyPr spcFirstLastPara="1" wrap="square" lIns="91424" tIns="91424" rIns="91424" bIns="91424" anchor="ctr" anchorCtr="0">
+          <a:bodyPr spcFirstLastPara="1" wrap="square" lIns="91423" tIns="91423" rIns="91423" bIns="91423" anchor="ctr" anchorCtr="0">
             <a:noAutofit/>
           </a:bodyPr>
           <a:lstStyle/>
@@ -23419,7 +23419,7 @@
           </a:prstGeom>
         </p:spPr>
         <p:txBody>
-          <a:bodyPr spcFirstLastPara="1" wrap="square" lIns="91424" tIns="91424" rIns="91424" bIns="91424" anchor="ctr" anchorCtr="0">
+          <a:bodyPr spcFirstLastPara="1" wrap="square" lIns="91423" tIns="91423" rIns="91423" bIns="91423" anchor="ctr" anchorCtr="0">
             <a:noAutofit/>
           </a:bodyPr>
           <a:lstStyle/>
@@ -23493,7 +23493,7 @@
           </a:prstGeom>
         </p:spPr>
         <p:txBody>
-          <a:bodyPr spcFirstLastPara="1" wrap="square" lIns="91424" tIns="91424" rIns="91424" bIns="91424" anchor="ctr" anchorCtr="0">
+          <a:bodyPr spcFirstLastPara="1" wrap="square" lIns="91423" tIns="91423" rIns="91423" bIns="91423" anchor="ctr" anchorCtr="0">
             <a:noAutofit/>
           </a:bodyPr>
           <a:lstStyle/>
@@ -23830,7 +23830,7 @@
         </p:nvSpPr>
         <p:spPr bwMode="auto">
           <a:xfrm>
-            <a:off x="3857797" y="1351558"/>
+            <a:off x="3857797" y="1351557"/>
             <a:ext cx="291283" cy="11650"/>
           </a:xfrm>
           <a:custGeom>
@@ -24080,7 +24080,7 @@
         <p:spPr bwMode="auto">
           <a:xfrm>
             <a:off x="5186054" y="1071925"/>
-            <a:ext cx="69907" cy="582567"/>
+            <a:ext cx="69907" cy="582566"/>
           </a:xfrm>
           <a:custGeom>
             <a:avLst/>
@@ -24854,7 +24854,7 @@
         </p:nvSpPr>
         <p:spPr bwMode="auto">
           <a:xfrm>
-            <a:off x="5745319" y="2574953"/>
+            <a:off x="5745318" y="2574953"/>
             <a:ext cx="128163" cy="58255"/>
           </a:xfrm>
           <a:custGeom>
@@ -25179,7 +25179,7 @@
         </p:nvSpPr>
         <p:spPr bwMode="auto">
           <a:xfrm>
-            <a:off x="7982383" y="1922475"/>
+            <a:off x="7982383" y="1922474"/>
             <a:ext cx="244677" cy="570915"/>
           </a:xfrm>
           <a:custGeom>
@@ -25407,7 +25407,7 @@
         </p:nvSpPr>
         <p:spPr bwMode="auto">
           <a:xfrm>
-            <a:off x="6607521" y="3367246"/>
+            <a:off x="6607521" y="3367245"/>
             <a:ext cx="267981" cy="81558"/>
           </a:xfrm>
           <a:custGeom>
@@ -26850,7 +26850,7 @@
         </p:nvSpPr>
         <p:spPr bwMode="auto">
           <a:xfrm>
-            <a:off x="8378532" y="4672201"/>
+            <a:off x="8390183" y="4660547"/>
             <a:ext cx="372842" cy="337889"/>
           </a:xfrm>
           <a:custGeom>
@@ -27325,7 +27325,7 @@
         </p:nvSpPr>
         <p:spPr bwMode="auto">
           <a:xfrm>
-            <a:off x="1562475" y="4357613"/>
+            <a:off x="1562474" y="4357613"/>
             <a:ext cx="1153485" cy="489357"/>
           </a:xfrm>
           <a:custGeom>
@@ -27507,7 +27507,7 @@
           </a:prstGeom>
         </p:spPr>
         <p:txBody>
-          <a:bodyPr spcFirstLastPara="1" wrap="square" lIns="91424" tIns="91424" rIns="91424" bIns="91424" anchor="ctr" anchorCtr="0">
+          <a:bodyPr spcFirstLastPara="1" wrap="square" lIns="91423" tIns="91423" rIns="91423" bIns="91423" anchor="ctr" anchorCtr="0">
             <a:noAutofit/>
           </a:bodyPr>
           <a:lstStyle/>
@@ -27812,7 +27812,7 @@
           </a:prstGeom>
         </p:spPr>
         <p:txBody>
-          <a:bodyPr spcFirstLastPara="1" wrap="square" lIns="91424" tIns="91424" rIns="91424" bIns="91424" anchor="ctr" anchorCtr="0">
+          <a:bodyPr spcFirstLastPara="1" wrap="square" lIns="91423" tIns="91423" rIns="91423" bIns="91423" anchor="ctr" anchorCtr="0">
             <a:noAutofit/>
           </a:bodyPr>
           <a:lstStyle/>
@@ -28117,7 +28117,7 @@
           </a:prstGeom>
         </p:spPr>
         <p:txBody>
-          <a:bodyPr spcFirstLastPara="1" wrap="square" lIns="91424" tIns="91424" rIns="91424" bIns="91424" anchor="ctr" anchorCtr="0">
+          <a:bodyPr spcFirstLastPara="1" wrap="square" lIns="91423" tIns="91423" rIns="91423" bIns="91423" anchor="ctr" anchorCtr="0">
             <a:noAutofit/>
           </a:bodyPr>
           <a:lstStyle/>
@@ -28782,7 +28782,7 @@
           </a:prstGeom>
         </p:spPr>
         <p:txBody>
-          <a:bodyPr spcFirstLastPara="1" wrap="square" lIns="91424" tIns="91424" rIns="91424" bIns="91424" anchor="ctr" anchorCtr="0">
+          <a:bodyPr spcFirstLastPara="1" wrap="square" lIns="91423" tIns="91423" rIns="91423" bIns="91423" anchor="ctr" anchorCtr="0">
             <a:noAutofit/>
           </a:bodyPr>
           <a:lstStyle/>
@@ -29088,7 +29088,7 @@
           </a:ln>
         </p:spPr>
         <p:txBody>
-          <a:bodyPr spcFirstLastPara="1" wrap="square" lIns="91424" tIns="91424" rIns="91424" bIns="91424" anchor="ctr" anchorCtr="0">
+          <a:bodyPr spcFirstLastPara="1" wrap="square" lIns="91423" tIns="91423" rIns="91423" bIns="91423" anchor="ctr" anchorCtr="0">
             <a:noAutofit/>
           </a:bodyPr>
           <a:lstStyle/>
@@ -29158,7 +29158,7 @@
           </a:prstGeom>
         </p:spPr>
         <p:txBody>
-          <a:bodyPr spcFirstLastPara="1" wrap="square" lIns="91424" tIns="91424" rIns="91424" bIns="91424" anchor="ctr" anchorCtr="0">
+          <a:bodyPr spcFirstLastPara="1" wrap="square" lIns="91423" tIns="91423" rIns="91423" bIns="91423" anchor="ctr" anchorCtr="0">
             <a:noAutofit/>
           </a:bodyPr>
           <a:lstStyle/>
@@ -29232,7 +29232,7 @@
           </a:prstGeom>
         </p:spPr>
         <p:txBody>
-          <a:bodyPr spcFirstLastPara="1" wrap="square" lIns="91424" tIns="91424" rIns="91424" bIns="91424" anchor="ctr" anchorCtr="0">
+          <a:bodyPr spcFirstLastPara="1" wrap="square" lIns="91423" tIns="91423" rIns="91423" bIns="91423" anchor="ctr" anchorCtr="0">
             <a:noAutofit/>
           </a:bodyPr>
           <a:lstStyle/>
@@ -29633,7 +29633,7 @@
           </a:prstGeom>
         </p:spPr>
         <p:txBody>
-          <a:bodyPr spcFirstLastPara="1" wrap="square" lIns="91424" tIns="91424" rIns="91424" bIns="91424" anchor="ctr" anchorCtr="0">
+          <a:bodyPr spcFirstLastPara="1" wrap="square" lIns="91423" tIns="91423" rIns="91423" bIns="91423" anchor="ctr" anchorCtr="0">
             <a:noAutofit/>
           </a:bodyPr>
           <a:lstStyle/>
@@ -29802,8 +29802,8 @@
         </p:nvSpPr>
         <p:spPr bwMode="auto">
           <a:xfrm>
-            <a:off x="1259539" y="4019724"/>
-            <a:ext cx="1619539" cy="419449"/>
+            <a:off x="1259538" y="4019724"/>
+            <a:ext cx="1619538" cy="419449"/>
           </a:xfrm>
           <a:custGeom>
             <a:avLst/>
@@ -29912,7 +29912,7 @@
           </a:prstGeom>
         </p:spPr>
         <p:txBody>
-          <a:bodyPr spcFirstLastPara="1" wrap="square" lIns="91424" tIns="91424" rIns="91424" bIns="91424" anchor="ctr" anchorCtr="0">
+          <a:bodyPr spcFirstLastPara="1" wrap="square" lIns="91423" tIns="91423" rIns="91423" bIns="91423" anchor="ctr" anchorCtr="0">
             <a:noAutofit/>
           </a:bodyPr>
           <a:lstStyle/>
@@ -30124,7 +30124,7 @@
           </a:prstGeom>
         </p:spPr>
         <p:txBody>
-          <a:bodyPr spcFirstLastPara="1" wrap="square" lIns="91424" tIns="91424" rIns="91424" bIns="91424" anchor="ctr" anchorCtr="0">
+          <a:bodyPr spcFirstLastPara="1" wrap="square" lIns="91423" tIns="91423" rIns="91423" bIns="91423" anchor="ctr" anchorCtr="0">
             <a:noAutofit/>
           </a:bodyPr>
           <a:lstStyle/>
@@ -30209,7 +30209,7 @@
           </a:ln>
         </p:spPr>
         <p:txBody>
-          <a:bodyPr spcFirstLastPara="1" wrap="square" lIns="91424" tIns="91424" rIns="91424" bIns="91424" anchor="ctr" anchorCtr="0">
+          <a:bodyPr spcFirstLastPara="1" wrap="square" lIns="91423" tIns="91423" rIns="91423" bIns="91423" anchor="ctr" anchorCtr="0">
             <a:noAutofit/>
           </a:bodyPr>
           <a:lstStyle/>
@@ -30250,7 +30250,7 @@
           </a:ln>
         </p:spPr>
         <p:txBody>
-          <a:bodyPr spcFirstLastPara="1" wrap="square" lIns="91424" tIns="91424" rIns="91424" bIns="91424" anchor="ctr" anchorCtr="0">
+          <a:bodyPr spcFirstLastPara="1" wrap="square" lIns="91423" tIns="91423" rIns="91423" bIns="91423" anchor="ctr" anchorCtr="0">
             <a:noAutofit/>
           </a:bodyPr>
           <a:lstStyle/>
@@ -30289,7 +30289,7 @@
           </a:ln>
         </p:spPr>
         <p:txBody>
-          <a:bodyPr spcFirstLastPara="1" wrap="square" lIns="91424" tIns="91424" rIns="91424" bIns="91424" anchor="ctr" anchorCtr="0">
+          <a:bodyPr spcFirstLastPara="1" wrap="square" lIns="91423" tIns="91423" rIns="91423" bIns="91423" anchor="ctr" anchorCtr="0">
             <a:noAutofit/>
           </a:bodyPr>
           <a:lstStyle/>
@@ -30610,7 +30610,7 @@
         </p:nvSpPr>
         <p:spPr bwMode="auto">
           <a:xfrm>
-            <a:off x="5477338" y="1351558"/>
+            <a:off x="5477337" y="1351557"/>
             <a:ext cx="128163" cy="466054"/>
           </a:xfrm>
           <a:custGeom>
@@ -31316,7 +31316,7 @@
         <p:spPr bwMode="auto">
           <a:xfrm>
             <a:off x="6129815" y="3180825"/>
-            <a:ext cx="734035" cy="687430"/>
+            <a:ext cx="734034" cy="687430"/>
           </a:xfrm>
           <a:custGeom>
             <a:avLst/>
@@ -33278,7 +33278,7 @@
           </a:ln>
         </p:spPr>
         <p:txBody>
-          <a:bodyPr spcFirstLastPara="1" wrap="square" lIns="91424" tIns="91424" rIns="91424" bIns="91424" anchor="ctr" anchorCtr="0">
+          <a:bodyPr spcFirstLastPara="1" wrap="square" lIns="91423" tIns="91423" rIns="91423" bIns="91423" anchor="ctr" anchorCtr="0">
             <a:noAutofit/>
           </a:bodyPr>
           <a:lstStyle/>
@@ -33319,7 +33319,7 @@
           </a:ln>
         </p:spPr>
         <p:txBody>
-          <a:bodyPr spcFirstLastPara="1" wrap="square" lIns="91424" tIns="91424" rIns="91424" bIns="91424" anchor="ctr" anchorCtr="0">
+          <a:bodyPr spcFirstLastPara="1" wrap="square" lIns="91423" tIns="91423" rIns="91423" bIns="91423" anchor="ctr" anchorCtr="0">
             <a:noAutofit/>
           </a:bodyPr>
           <a:lstStyle/>
@@ -33358,7 +33358,7 @@
           </a:ln>
         </p:spPr>
         <p:txBody>
-          <a:bodyPr spcFirstLastPara="1" wrap="square" lIns="91424" tIns="91424" rIns="91424" bIns="91424" anchor="ctr" anchorCtr="0">
+          <a:bodyPr spcFirstLastPara="1" wrap="square" lIns="91423" tIns="91423" rIns="91423" bIns="91423" anchor="ctr" anchorCtr="0">
             <a:noAutofit/>
           </a:bodyPr>
           <a:lstStyle/>
@@ -34044,7 +34044,7 @@
           </a:ln>
         </p:spPr>
         <p:txBody>
-          <a:bodyPr spcFirstLastPara="1" wrap="square" lIns="91424" tIns="91424" rIns="91424" bIns="91424" anchor="ctr" anchorCtr="0">
+          <a:bodyPr spcFirstLastPara="1" wrap="square" lIns="91423" tIns="91423" rIns="91423" bIns="91423" anchor="ctr" anchorCtr="0">
             <a:noAutofit/>
           </a:bodyPr>
           <a:lstStyle/>
@@ -34085,7 +34085,7 @@
           </a:ln>
         </p:spPr>
         <p:txBody>
-          <a:bodyPr spcFirstLastPara="1" wrap="square" lIns="91424" tIns="91424" rIns="91424" bIns="91424" anchor="ctr" anchorCtr="0">
+          <a:bodyPr spcFirstLastPara="1" wrap="square" lIns="91423" tIns="91423" rIns="91423" bIns="91423" anchor="ctr" anchorCtr="0">
             <a:noAutofit/>
           </a:bodyPr>
           <a:lstStyle/>
@@ -34124,7 +34124,7 @@
           </a:ln>
         </p:spPr>
         <p:txBody>
-          <a:bodyPr spcFirstLastPara="1" wrap="square" lIns="91424" tIns="91424" rIns="91424" bIns="91424" anchor="ctr" anchorCtr="0">
+          <a:bodyPr spcFirstLastPara="1" wrap="square" lIns="91423" tIns="91423" rIns="91423" bIns="91423" anchor="ctr" anchorCtr="0">
             <a:noAutofit/>
           </a:bodyPr>
           <a:lstStyle/>
@@ -35276,7 +35276,7 @@
         <p:spPr bwMode="auto">
           <a:xfrm>
             <a:off x="9753393" y="3903210"/>
-            <a:ext cx="734035" cy="1304953"/>
+            <a:ext cx="734034" cy="1304953"/>
           </a:xfrm>
           <a:custGeom>
             <a:avLst/>
@@ -35401,7 +35401,7 @@
           </a:ln>
         </p:spPr>
         <p:txBody>
-          <a:bodyPr spcFirstLastPara="1" wrap="square" lIns="91424" tIns="91424" rIns="91424" bIns="91424" anchor="ctr" anchorCtr="0">
+          <a:bodyPr spcFirstLastPara="1" wrap="square" lIns="91423" tIns="91423" rIns="91423" bIns="91423" anchor="ctr" anchorCtr="0">
             <a:noAutofit/>
           </a:bodyPr>
           <a:lstStyle/>
@@ -35442,7 +35442,7 @@
           </a:ln>
         </p:spPr>
         <p:txBody>
-          <a:bodyPr spcFirstLastPara="1" wrap="square" lIns="91424" tIns="91424" rIns="91424" bIns="91424" anchor="ctr" anchorCtr="0">
+          <a:bodyPr spcFirstLastPara="1" wrap="square" lIns="91423" tIns="91423" rIns="91423" bIns="91423" anchor="ctr" anchorCtr="0">
             <a:noAutofit/>
           </a:bodyPr>
           <a:lstStyle/>
@@ -35469,7 +35469,7 @@
         </p:nvSpPr>
         <p:spPr bwMode="auto">
           <a:xfrm>
-            <a:off x="5296999" y="1846599"/>
+            <a:off x="5296999" y="1846598"/>
             <a:ext cx="6474799" cy="3164400"/>
           </a:xfrm>
           <a:prstGeom prst="rect">
@@ -35481,7 +35481,7 @@
           </a:ln>
         </p:spPr>
         <p:txBody>
-          <a:bodyPr spcFirstLastPara="1" wrap="square" lIns="91424" tIns="91424" rIns="91424" bIns="91424" anchor="ctr" anchorCtr="0">
+          <a:bodyPr spcFirstLastPara="1" wrap="square" lIns="91423" tIns="91423" rIns="91423" bIns="91423" anchor="ctr" anchorCtr="0">
             <a:noAutofit/>
           </a:bodyPr>
           <a:lstStyle/>
@@ -35941,7 +35941,7 @@
           </a:ln>
         </p:spPr>
         <p:txBody>
-          <a:bodyPr spcFirstLastPara="1" wrap="square" lIns="91424" tIns="91424" rIns="91424" bIns="91424" anchor="ctr" anchorCtr="0">
+          <a:bodyPr spcFirstLastPara="1" wrap="square" lIns="91423" tIns="91423" rIns="91423" bIns="91423" anchor="ctr" anchorCtr="0">
             <a:noAutofit/>
           </a:bodyPr>
           <a:lstStyle/>
@@ -35982,7 +35982,7 @@
           </a:ln>
         </p:spPr>
         <p:txBody>
-          <a:bodyPr spcFirstLastPara="1" wrap="square" lIns="91424" tIns="91424" rIns="91424" bIns="91424" anchor="ctr" anchorCtr="0">
+          <a:bodyPr spcFirstLastPara="1" wrap="square" lIns="91423" tIns="91423" rIns="91423" bIns="91423" anchor="ctr" anchorCtr="0">
             <a:noAutofit/>
           </a:bodyPr>
           <a:lstStyle/>
@@ -36009,7 +36009,7 @@
         </p:nvSpPr>
         <p:spPr bwMode="auto">
           <a:xfrm>
-            <a:off x="5296999" y="1846599"/>
+            <a:off x="5296999" y="1846598"/>
             <a:ext cx="6474799" cy="3164400"/>
           </a:xfrm>
           <a:prstGeom prst="rect">
@@ -36021,7 +36021,7 @@
           </a:ln>
         </p:spPr>
         <p:txBody>
-          <a:bodyPr spcFirstLastPara="1" wrap="square" lIns="91424" tIns="91424" rIns="91424" bIns="91424" anchor="ctr" anchorCtr="0">
+          <a:bodyPr spcFirstLastPara="1" wrap="square" lIns="91423" tIns="91423" rIns="91423" bIns="91423" anchor="ctr" anchorCtr="0">
             <a:noAutofit/>
           </a:bodyPr>
           <a:lstStyle/>
@@ -36624,7 +36624,7 @@
         <p:spPr bwMode="auto">
           <a:xfrm>
             <a:off x="5162750" y="1829265"/>
-            <a:ext cx="1619539" cy="594218"/>
+            <a:ext cx="1619538" cy="594218"/>
           </a:xfrm>
           <a:custGeom>
             <a:avLst/>
@@ -38403,7 +38403,7 @@
           </a:prstGeom>
         </p:spPr>
         <p:txBody>
-          <a:bodyPr spcFirstLastPara="1" wrap="square" lIns="91424" tIns="91424" rIns="91424" bIns="91424" anchor="ctr" anchorCtr="0">
+          <a:bodyPr spcFirstLastPara="1" wrap="square" lIns="91423" tIns="91423" rIns="91423" bIns="91423" anchor="ctr" anchorCtr="0">
             <a:noAutofit/>
           </a:bodyPr>
           <a:lstStyle/>
@@ -38651,7 +38651,7 @@
           </a:ln>
         </p:spPr>
         <p:txBody>
-          <a:bodyPr spcFirstLastPara="1" wrap="square" lIns="91424" tIns="91424" rIns="91424" bIns="91424" anchor="ctr" anchorCtr="0">
+          <a:bodyPr spcFirstLastPara="1" wrap="square" lIns="91423" tIns="91423" rIns="91423" bIns="91423" anchor="ctr" anchorCtr="0">
             <a:noAutofit/>
           </a:bodyPr>
           <a:lstStyle/>
@@ -38692,7 +38692,7 @@
           </a:ln>
         </p:spPr>
         <p:txBody>
-          <a:bodyPr spcFirstLastPara="1" wrap="square" lIns="91424" tIns="91424" rIns="91424" bIns="91424" anchor="ctr" anchorCtr="0">
+          <a:bodyPr spcFirstLastPara="1" wrap="square" lIns="91423" tIns="91423" rIns="91423" bIns="91423" anchor="ctr" anchorCtr="0">
             <a:noAutofit/>
           </a:bodyPr>
           <a:lstStyle/>
@@ -38719,7 +38719,7 @@
         </p:nvSpPr>
         <p:spPr bwMode="auto">
           <a:xfrm>
-            <a:off x="5296999" y="1846599"/>
+            <a:off x="5296999" y="1846598"/>
             <a:ext cx="6474799" cy="3164400"/>
           </a:xfrm>
           <a:prstGeom prst="rect">
@@ -38731,7 +38731,7 @@
           </a:ln>
         </p:spPr>
         <p:txBody>
-          <a:bodyPr spcFirstLastPara="1" wrap="square" lIns="91424" tIns="91424" rIns="91424" bIns="91424" anchor="ctr" anchorCtr="0">
+          <a:bodyPr spcFirstLastPara="1" wrap="square" lIns="91423" tIns="91423" rIns="91423" bIns="91423" anchor="ctr" anchorCtr="0">
             <a:noAutofit/>
           </a:bodyPr>
           <a:lstStyle/>
@@ -38999,7 +38999,7 @@
         </p:nvSpPr>
         <p:spPr bwMode="auto">
           <a:xfrm>
-            <a:off x="4428714" y="3460457"/>
+            <a:off x="4428714" y="3460456"/>
             <a:ext cx="431100" cy="11650"/>
           </a:xfrm>
           <a:custGeom>
@@ -39184,7 +39184,7 @@
           </a:ln>
         </p:spPr>
         <p:txBody>
-          <a:bodyPr spcFirstLastPara="1" wrap="square" lIns="91424" tIns="91424" rIns="91424" bIns="91424" anchor="ctr" anchorCtr="0">
+          <a:bodyPr spcFirstLastPara="1" wrap="square" lIns="91423" tIns="91423" rIns="91423" bIns="91423" anchor="ctr" anchorCtr="0">
             <a:noAutofit/>
           </a:bodyPr>
           <a:lstStyle/>
@@ -39225,7 +39225,7 @@
           </a:ln>
         </p:spPr>
         <p:txBody>
-          <a:bodyPr spcFirstLastPara="1" wrap="square" lIns="91424" tIns="91424" rIns="91424" bIns="91424" anchor="ctr" anchorCtr="0">
+          <a:bodyPr spcFirstLastPara="1" wrap="square" lIns="91423" tIns="91423" rIns="91423" bIns="91423" anchor="ctr" anchorCtr="0">
             <a:noAutofit/>
           </a:bodyPr>
           <a:lstStyle/>
@@ -39252,7 +39252,7 @@
         </p:nvSpPr>
         <p:spPr bwMode="auto">
           <a:xfrm>
-            <a:off x="5296999" y="1846599"/>
+            <a:off x="5296999" y="1846598"/>
             <a:ext cx="6474799" cy="3164400"/>
           </a:xfrm>
           <a:prstGeom prst="rect">
@@ -39264,7 +39264,7 @@
           </a:ln>
         </p:spPr>
         <p:txBody>
-          <a:bodyPr spcFirstLastPara="1" wrap="square" lIns="91424" tIns="91424" rIns="91424" bIns="91424" anchor="ctr" anchorCtr="0">
+          <a:bodyPr spcFirstLastPara="1" wrap="square" lIns="91423" tIns="91423" rIns="91423" bIns="91423" anchor="ctr" anchorCtr="0">
             <a:noAutofit/>
           </a:bodyPr>
           <a:lstStyle/>
@@ -40189,7 +40189,7 @@
         </p:nvSpPr>
         <p:spPr bwMode="auto">
           <a:xfrm>
-            <a:off x="875045" y="1922475"/>
+            <a:off x="875045" y="1922474"/>
             <a:ext cx="629173" cy="93210"/>
           </a:xfrm>
           <a:custGeom>
@@ -40876,7 +40876,7 @@
           </a:ln>
         </p:spPr>
         <p:txBody>
-          <a:bodyPr spcFirstLastPara="1" wrap="square" lIns="91424" tIns="91424" rIns="91424" bIns="91424" anchor="ctr" anchorCtr="0">
+          <a:bodyPr spcFirstLastPara="1" wrap="square" lIns="91423" tIns="91423" rIns="91423" bIns="91423" anchor="ctr" anchorCtr="0">
             <a:noAutofit/>
           </a:bodyPr>
           <a:lstStyle/>
@@ -40917,7 +40917,7 @@
           </a:ln>
         </p:spPr>
         <p:txBody>
-          <a:bodyPr spcFirstLastPara="1" wrap="square" lIns="91424" tIns="91424" rIns="91424" bIns="91424" anchor="ctr" anchorCtr="0">
+          <a:bodyPr spcFirstLastPara="1" wrap="square" lIns="91423" tIns="91423" rIns="91423" bIns="91423" anchor="ctr" anchorCtr="0">
             <a:noAutofit/>
           </a:bodyPr>
           <a:lstStyle/>
@@ -40944,7 +40944,7 @@
         </p:nvSpPr>
         <p:spPr bwMode="auto">
           <a:xfrm>
-            <a:off x="5296999" y="1846599"/>
+            <a:off x="5296999" y="1846598"/>
             <a:ext cx="6474799" cy="3164400"/>
           </a:xfrm>
           <a:prstGeom prst="rect">
@@ -40956,7 +40956,7 @@
           </a:ln>
         </p:spPr>
         <p:txBody>
-          <a:bodyPr spcFirstLastPara="1" wrap="square" lIns="91424" tIns="91424" rIns="91424" bIns="91424" anchor="ctr" anchorCtr="0">
+          <a:bodyPr spcFirstLastPara="1" wrap="square" lIns="91423" tIns="91423" rIns="91423" bIns="91423" anchor="ctr" anchorCtr="0">
             <a:noAutofit/>
           </a:bodyPr>
           <a:lstStyle/>
@@ -41443,7 +41443,7 @@
         </p:nvSpPr>
         <p:spPr bwMode="auto">
           <a:xfrm>
-            <a:off x="5384127" y="3041007"/>
+            <a:off x="5384126" y="3041007"/>
             <a:ext cx="850549" cy="46603"/>
           </a:xfrm>
           <a:custGeom>
@@ -41651,7 +41651,7 @@
         </p:nvSpPr>
         <p:spPr bwMode="auto">
           <a:xfrm>
-            <a:off x="9427154" y="2493393"/>
+            <a:off x="9427154" y="2493392"/>
             <a:ext cx="454402" cy="361191"/>
           </a:xfrm>
           <a:custGeom>
@@ -42219,8 +42219,8 @@
         </p:nvSpPr>
         <p:spPr bwMode="auto">
           <a:xfrm>
-            <a:off x="6677430" y="3145870"/>
-            <a:ext cx="792291" cy="477705"/>
+            <a:off x="6677429" y="3145870"/>
+            <a:ext cx="792290" cy="477705"/>
           </a:xfrm>
           <a:custGeom>
             <a:avLst/>
@@ -42294,7 +42294,7 @@
         </p:nvSpPr>
         <p:spPr bwMode="auto">
           <a:xfrm>
-            <a:off x="6642475" y="3460457"/>
+            <a:off x="6642475" y="3460456"/>
             <a:ext cx="337889" cy="256329"/>
           </a:xfrm>
           <a:custGeom>
@@ -42711,7 +42711,7 @@
         <p:spPr bwMode="auto">
           <a:xfrm>
             <a:off x="6281283" y="5546054"/>
-            <a:ext cx="372842" cy="734035"/>
+            <a:ext cx="372842" cy="734034"/>
           </a:xfrm>
           <a:custGeom>
             <a:avLst/>
@@ -42916,7 +42916,7 @@
           </a:ln>
         </p:spPr>
         <p:txBody>
-          <a:bodyPr spcFirstLastPara="1" wrap="square" lIns="91424" tIns="91424" rIns="91424" bIns="91424" anchor="ctr" anchorCtr="0">
+          <a:bodyPr spcFirstLastPara="1" wrap="square" lIns="91423" tIns="91423" rIns="91423" bIns="91423" anchor="ctr" anchorCtr="0">
             <a:noAutofit/>
           </a:bodyPr>
           <a:lstStyle/>
@@ -42957,7 +42957,7 @@
           </a:ln>
         </p:spPr>
         <p:txBody>
-          <a:bodyPr spcFirstLastPara="1" wrap="square" lIns="91424" tIns="91424" rIns="91424" bIns="91424" anchor="ctr" anchorCtr="0">
+          <a:bodyPr spcFirstLastPara="1" wrap="square" lIns="91423" tIns="91423" rIns="91423" bIns="91423" anchor="ctr" anchorCtr="0">
             <a:noAutofit/>
           </a:bodyPr>
           <a:lstStyle/>
@@ -42984,7 +42984,7 @@
         </p:nvSpPr>
         <p:spPr bwMode="auto">
           <a:xfrm>
-            <a:off x="5296999" y="1846599"/>
+            <a:off x="5296999" y="1846598"/>
             <a:ext cx="6474799" cy="3164400"/>
           </a:xfrm>
           <a:prstGeom prst="rect">
@@ -42996,7 +42996,7 @@
           </a:ln>
         </p:spPr>
         <p:txBody>
-          <a:bodyPr spcFirstLastPara="1" wrap="square" lIns="91424" tIns="91424" rIns="91424" bIns="91424" anchor="ctr" anchorCtr="0">
+          <a:bodyPr spcFirstLastPara="1" wrap="square" lIns="91423" tIns="91423" rIns="91423" bIns="91423" anchor="ctr" anchorCtr="0">
             <a:noAutofit/>
           </a:bodyPr>
           <a:lstStyle/>
@@ -43605,7 +43605,7 @@
         </p:nvSpPr>
         <p:spPr bwMode="auto">
           <a:xfrm>
-            <a:off x="6805595" y="3879907"/>
+            <a:off x="6805595" y="3879906"/>
             <a:ext cx="524310" cy="221375"/>
           </a:xfrm>
           <a:custGeom>
@@ -45121,7 +45121,7 @@
         </p:nvSpPr>
         <p:spPr bwMode="auto">
           <a:xfrm>
-            <a:off x="8623209" y="792291"/>
+            <a:off x="8623209" y="792290"/>
             <a:ext cx="699081" cy="326237"/>
           </a:xfrm>
           <a:custGeom>
@@ -45547,7 +45547,7 @@
           </a:ln>
         </p:spPr>
         <p:txBody>
-          <a:bodyPr spcFirstLastPara="1" wrap="square" lIns="91424" tIns="91424" rIns="91424" bIns="91424" anchor="ctr" anchorCtr="0">
+          <a:bodyPr spcFirstLastPara="1" wrap="square" lIns="91423" tIns="91423" rIns="91423" bIns="91423" anchor="ctr" anchorCtr="0">
             <a:noAutofit/>
           </a:bodyPr>
           <a:lstStyle/>
@@ -45588,7 +45588,7 @@
           </a:ln>
         </p:spPr>
         <p:txBody>
-          <a:bodyPr spcFirstLastPara="1" wrap="square" lIns="91424" tIns="91424" rIns="91424" bIns="91424" anchor="ctr" anchorCtr="0">
+          <a:bodyPr spcFirstLastPara="1" wrap="square" lIns="91423" tIns="91423" rIns="91423" bIns="91423" anchor="ctr" anchorCtr="0">
             <a:noAutofit/>
           </a:bodyPr>
           <a:lstStyle/>
@@ -45615,7 +45615,7 @@
         </p:nvSpPr>
         <p:spPr bwMode="auto">
           <a:xfrm>
-            <a:off x="5296999" y="1846599"/>
+            <a:off x="5296999" y="1846598"/>
             <a:ext cx="6474799" cy="3164400"/>
           </a:xfrm>
           <a:prstGeom prst="rect">
@@ -45627,7 +45627,7 @@
           </a:ln>
         </p:spPr>
         <p:txBody>
-          <a:bodyPr spcFirstLastPara="1" wrap="square" lIns="91424" tIns="91424" rIns="91424" bIns="91424" anchor="ctr" anchorCtr="0">
+          <a:bodyPr spcFirstLastPara="1" wrap="square" lIns="91423" tIns="91423" rIns="91423" bIns="91423" anchor="ctr" anchorCtr="0">
             <a:noAutofit/>
           </a:bodyPr>
           <a:lstStyle/>
@@ -46052,7 +46052,7 @@
           </a:prstGeom>
         </p:spPr>
         <p:txBody>
-          <a:bodyPr spcFirstLastPara="1" wrap="square" lIns="91424" tIns="91424" rIns="91424" bIns="91424" anchor="ctr" anchorCtr="0">
+          <a:bodyPr spcFirstLastPara="1" wrap="square" lIns="91423" tIns="91423" rIns="91423" bIns="91423" anchor="ctr" anchorCtr="0">
             <a:noAutofit/>
           </a:bodyPr>
           <a:lstStyle/>
@@ -46346,7 +46346,7 @@
           </a:ln>
         </p:spPr>
         <p:txBody>
-          <a:bodyPr spcFirstLastPara="1" wrap="square" lIns="91424" tIns="91424" rIns="91424" bIns="91424" anchor="ctr" anchorCtr="0">
+          <a:bodyPr spcFirstLastPara="1" wrap="square" lIns="91423" tIns="91423" rIns="91423" bIns="91423" anchor="ctr" anchorCtr="0">
             <a:noAutofit/>
           </a:bodyPr>
           <a:lstStyle/>
@@ -46383,7 +46383,7 @@
           </a:prstGeom>
         </p:spPr>
         <p:txBody>
-          <a:bodyPr spcFirstLastPara="1" wrap="square" lIns="91424" tIns="91424" rIns="91424" bIns="91424" anchor="ctr" anchorCtr="0">
+          <a:bodyPr spcFirstLastPara="1" wrap="square" lIns="91423" tIns="91423" rIns="91423" bIns="91423" anchor="ctr" anchorCtr="0">
             <a:noAutofit/>
           </a:bodyPr>
           <a:lstStyle/>
@@ -46426,7 +46426,7 @@
           </a:ln>
         </p:spPr>
         <p:txBody>
-          <a:bodyPr spcFirstLastPara="1" wrap="square" lIns="91424" tIns="91424" rIns="91424" bIns="91424" anchor="t" anchorCtr="0">
+          <a:bodyPr spcFirstLastPara="1" wrap="square" lIns="91423" tIns="91423" rIns="91423" bIns="91423" anchor="t" anchorCtr="0">
             <a:noAutofit/>
           </a:bodyPr>
           <a:lstStyle/>
@@ -46485,7 +46485,7 @@
           </a:ln>
         </p:spPr>
         <p:txBody>
-          <a:bodyPr spcFirstLastPara="1" wrap="square" lIns="91424" tIns="91424" rIns="91424" bIns="91424" anchor="t" anchorCtr="0">
+          <a:bodyPr spcFirstLastPara="1" wrap="square" lIns="91423" tIns="91423" rIns="91423" bIns="91423" anchor="t" anchorCtr="0">
             <a:noAutofit/>
           </a:bodyPr>
           <a:lstStyle/>

</xml_diff>